<commit_message>
add saveing pth and some bounding box tool
</commit_message>
<xml_diff>
--- a/Torch_train.pptx
+++ b/Torch_train.pptx
@@ -5,7 +5,7 @@
     <p:sldMasterId id="2147483648" r:id="rId1"/>
   </p:sldMasterIdLst>
   <p:notesMasterIdLst>
-    <p:notesMasterId r:id="rId18"/>
+    <p:notesMasterId r:id="rId21"/>
   </p:notesMasterIdLst>
   <p:sldIdLst>
     <p:sldId id="256" r:id="rId2"/>
@@ -16,14 +16,17 @@
     <p:sldId id="267" r:id="rId7"/>
     <p:sldId id="268" r:id="rId8"/>
     <p:sldId id="269" r:id="rId9"/>
-    <p:sldId id="273" r:id="rId10"/>
-    <p:sldId id="260" r:id="rId11"/>
-    <p:sldId id="272" r:id="rId12"/>
-    <p:sldId id="263" r:id="rId13"/>
-    <p:sldId id="262" r:id="rId14"/>
-    <p:sldId id="258" r:id="rId15"/>
-    <p:sldId id="259" r:id="rId16"/>
-    <p:sldId id="257" r:id="rId17"/>
+    <p:sldId id="276" r:id="rId10"/>
+    <p:sldId id="273" r:id="rId11"/>
+    <p:sldId id="260" r:id="rId12"/>
+    <p:sldId id="272" r:id="rId13"/>
+    <p:sldId id="263" r:id="rId14"/>
+    <p:sldId id="262" r:id="rId15"/>
+    <p:sldId id="258" r:id="rId16"/>
+    <p:sldId id="259" r:id="rId17"/>
+    <p:sldId id="257" r:id="rId18"/>
+    <p:sldId id="274" r:id="rId19"/>
+    <p:sldId id="275" r:id="rId20"/>
   </p:sldIdLst>
   <p:sldSz cx="12192000" cy="6858000"/>
   <p:notesSz cx="6858000" cy="9144000"/>
@@ -143,7 +146,7 @@
   <pc:docChgLst>
     <pc:chgData name="Tsai, Ping-Chen" userId="9132b96a-ba54-4186-bc65-f286b02f1bb4" providerId="ADAL" clId="{2C7D7F79-AD93-4ED7-BCDF-8616907FA700}"/>
     <pc:docChg chg="undo custSel addSld delSld modSld sldOrd">
-      <pc:chgData name="Tsai, Ping-Chen" userId="9132b96a-ba54-4186-bc65-f286b02f1bb4" providerId="ADAL" clId="{2C7D7F79-AD93-4ED7-BCDF-8616907FA700}" dt="2024-05-11T01:38:45.258" v="4192" actId="47"/>
+      <pc:chgData name="Tsai, Ping-Chen" userId="9132b96a-ba54-4186-bc65-f286b02f1bb4" providerId="ADAL" clId="{2C7D7F79-AD93-4ED7-BCDF-8616907FA700}" dt="2024-05-17T00:19:26.868" v="4423" actId="20577"/>
       <pc:docMkLst>
         <pc:docMk/>
       </pc:docMkLst>
@@ -656,6 +659,75 @@
           </ac:spMkLst>
         </pc:spChg>
       </pc:sldChg>
+      <pc:sldChg chg="modSp new mod">
+        <pc:chgData name="Tsai, Ping-Chen" userId="9132b96a-ba54-4186-bc65-f286b02f1bb4" providerId="ADAL" clId="{2C7D7F79-AD93-4ED7-BCDF-8616907FA700}" dt="2024-05-16T23:27:29.559" v="4256" actId="20577"/>
+        <pc:sldMkLst>
+          <pc:docMk/>
+          <pc:sldMk cId="3388768162" sldId="274"/>
+        </pc:sldMkLst>
+        <pc:spChg chg="mod">
+          <ac:chgData name="Tsai, Ping-Chen" userId="9132b96a-ba54-4186-bc65-f286b02f1bb4" providerId="ADAL" clId="{2C7D7F79-AD93-4ED7-BCDF-8616907FA700}" dt="2024-05-16T23:27:29.559" v="4256" actId="20577"/>
+          <ac:spMkLst>
+            <pc:docMk/>
+            <pc:sldMk cId="3388768162" sldId="274"/>
+            <ac:spMk id="2" creationId="{BEE0F620-552A-DA4A-2C3A-2664F6AC6B2F}"/>
+          </ac:spMkLst>
+        </pc:spChg>
+        <pc:spChg chg="mod">
+          <ac:chgData name="Tsai, Ping-Chen" userId="9132b96a-ba54-4186-bc65-f286b02f1bb4" providerId="ADAL" clId="{2C7D7F79-AD93-4ED7-BCDF-8616907FA700}" dt="2024-05-16T13:02:37.952" v="4194"/>
+          <ac:spMkLst>
+            <pc:docMk/>
+            <pc:sldMk cId="3388768162" sldId="274"/>
+            <ac:spMk id="3" creationId="{4CBCAD23-C501-5F7D-EF88-491044C0E9C1}"/>
+          </ac:spMkLst>
+        </pc:spChg>
+      </pc:sldChg>
+      <pc:sldChg chg="modSp new mod">
+        <pc:chgData name="Tsai, Ping-Chen" userId="9132b96a-ba54-4186-bc65-f286b02f1bb4" providerId="ADAL" clId="{2C7D7F79-AD93-4ED7-BCDF-8616907FA700}" dt="2024-05-17T00:19:26.868" v="4423" actId="20577"/>
+        <pc:sldMkLst>
+          <pc:docMk/>
+          <pc:sldMk cId="799057516" sldId="275"/>
+        </pc:sldMkLst>
+        <pc:spChg chg="mod">
+          <ac:chgData name="Tsai, Ping-Chen" userId="9132b96a-ba54-4186-bc65-f286b02f1bb4" providerId="ADAL" clId="{2C7D7F79-AD93-4ED7-BCDF-8616907FA700}" dt="2024-05-16T23:29:53.151" v="4272" actId="20577"/>
+          <ac:spMkLst>
+            <pc:docMk/>
+            <pc:sldMk cId="799057516" sldId="275"/>
+            <ac:spMk id="2" creationId="{EB16C9B9-4BF3-9062-E84F-A4CAC817943F}"/>
+          </ac:spMkLst>
+        </pc:spChg>
+        <pc:spChg chg="mod">
+          <ac:chgData name="Tsai, Ping-Chen" userId="9132b96a-ba54-4186-bc65-f286b02f1bb4" providerId="ADAL" clId="{2C7D7F79-AD93-4ED7-BCDF-8616907FA700}" dt="2024-05-17T00:19:26.868" v="4423" actId="20577"/>
+          <ac:spMkLst>
+            <pc:docMk/>
+            <pc:sldMk cId="799057516" sldId="275"/>
+            <ac:spMk id="3" creationId="{86B5C663-647B-7DFA-2853-D20B6F37872E}"/>
+          </ac:spMkLst>
+        </pc:spChg>
+      </pc:sldChg>
+      <pc:sldChg chg="modSp new mod">
+        <pc:chgData name="Tsai, Ping-Chen" userId="9132b96a-ba54-4186-bc65-f286b02f1bb4" providerId="ADAL" clId="{2C7D7F79-AD93-4ED7-BCDF-8616907FA700}" dt="2024-05-17T00:18:42.905" v="4376" actId="20577"/>
+        <pc:sldMkLst>
+          <pc:docMk/>
+          <pc:sldMk cId="946307909" sldId="276"/>
+        </pc:sldMkLst>
+        <pc:spChg chg="mod">
+          <ac:chgData name="Tsai, Ping-Chen" userId="9132b96a-ba54-4186-bc65-f286b02f1bb4" providerId="ADAL" clId="{2C7D7F79-AD93-4ED7-BCDF-8616907FA700}" dt="2024-05-17T00:18:36.923" v="4356" actId="20577"/>
+          <ac:spMkLst>
+            <pc:docMk/>
+            <pc:sldMk cId="946307909" sldId="276"/>
+            <ac:spMk id="2" creationId="{47EC095D-FC71-34C0-0D6F-8A76CD9CC283}"/>
+          </ac:spMkLst>
+        </pc:spChg>
+        <pc:spChg chg="mod">
+          <ac:chgData name="Tsai, Ping-Chen" userId="9132b96a-ba54-4186-bc65-f286b02f1bb4" providerId="ADAL" clId="{2C7D7F79-AD93-4ED7-BCDF-8616907FA700}" dt="2024-05-17T00:18:42.905" v="4376" actId="20577"/>
+          <ac:spMkLst>
+            <pc:docMk/>
+            <pc:sldMk cId="946307909" sldId="276"/>
+            <ac:spMk id="3" creationId="{C4625852-F318-2C3C-CB5E-D10A8A4B16FB}"/>
+          </ac:spMkLst>
+        </pc:spChg>
+      </pc:sldChg>
     </pc:docChg>
   </pc:docChgLst>
 </pc:chgInfo>
@@ -743,7 +815,7 @@
           <a:p>
             <a:fld id="{A6298B40-4180-456B-A5CA-A0ABF6427B13}" type="datetimeFigureOut">
               <a:rPr lang="en-GB" smtClean="0"/>
-              <a:t>10/05/2024</a:t>
+              <a:t>17/05/2024</a:t>
             </a:fld>
             <a:endParaRPr lang="en-GB"/>
           </a:p>
@@ -1110,7 +1182,7 @@
           <a:p>
             <a:fld id="{EEB4BD81-C856-4760-9842-D621A7A4E6F7}" type="slidenum">
               <a:rPr lang="en-GB" smtClean="0"/>
-              <a:t>16</a:t>
+              <a:t>17</a:t>
             </a:fld>
             <a:endParaRPr lang="en-GB"/>
           </a:p>
@@ -1278,7 +1350,7 @@
           <a:p>
             <a:fld id="{E5ACA199-D8D1-4546-831D-8EFC18AA6159}" type="datetimeFigureOut">
               <a:rPr lang="en-GB" smtClean="0"/>
-              <a:t>10/05/2024</a:t>
+              <a:t>17/05/2024</a:t>
             </a:fld>
             <a:endParaRPr lang="en-GB"/>
           </a:p>
@@ -1478,7 +1550,7 @@
           <a:p>
             <a:fld id="{E5ACA199-D8D1-4546-831D-8EFC18AA6159}" type="datetimeFigureOut">
               <a:rPr lang="en-GB" smtClean="0"/>
-              <a:t>10/05/2024</a:t>
+              <a:t>17/05/2024</a:t>
             </a:fld>
             <a:endParaRPr lang="en-GB"/>
           </a:p>
@@ -1688,7 +1760,7 @@
           <a:p>
             <a:fld id="{E5ACA199-D8D1-4546-831D-8EFC18AA6159}" type="datetimeFigureOut">
               <a:rPr lang="en-GB" smtClean="0"/>
-              <a:t>10/05/2024</a:t>
+              <a:t>17/05/2024</a:t>
             </a:fld>
             <a:endParaRPr lang="en-GB"/>
           </a:p>
@@ -1888,7 +1960,7 @@
           <a:p>
             <a:fld id="{E5ACA199-D8D1-4546-831D-8EFC18AA6159}" type="datetimeFigureOut">
               <a:rPr lang="en-GB" smtClean="0"/>
-              <a:t>10/05/2024</a:t>
+              <a:t>17/05/2024</a:t>
             </a:fld>
             <a:endParaRPr lang="en-GB"/>
           </a:p>
@@ -2164,7 +2236,7 @@
           <a:p>
             <a:fld id="{E5ACA199-D8D1-4546-831D-8EFC18AA6159}" type="datetimeFigureOut">
               <a:rPr lang="en-GB" smtClean="0"/>
-              <a:t>10/05/2024</a:t>
+              <a:t>17/05/2024</a:t>
             </a:fld>
             <a:endParaRPr lang="en-GB"/>
           </a:p>
@@ -2432,7 +2504,7 @@
           <a:p>
             <a:fld id="{E5ACA199-D8D1-4546-831D-8EFC18AA6159}" type="datetimeFigureOut">
               <a:rPr lang="en-GB" smtClean="0"/>
-              <a:t>10/05/2024</a:t>
+              <a:t>17/05/2024</a:t>
             </a:fld>
             <a:endParaRPr lang="en-GB"/>
           </a:p>
@@ -2847,7 +2919,7 @@
           <a:p>
             <a:fld id="{E5ACA199-D8D1-4546-831D-8EFC18AA6159}" type="datetimeFigureOut">
               <a:rPr lang="en-GB" smtClean="0"/>
-              <a:t>10/05/2024</a:t>
+              <a:t>17/05/2024</a:t>
             </a:fld>
             <a:endParaRPr lang="en-GB"/>
           </a:p>
@@ -2989,7 +3061,7 @@
           <a:p>
             <a:fld id="{E5ACA199-D8D1-4546-831D-8EFC18AA6159}" type="datetimeFigureOut">
               <a:rPr lang="en-GB" smtClean="0"/>
-              <a:t>10/05/2024</a:t>
+              <a:t>17/05/2024</a:t>
             </a:fld>
             <a:endParaRPr lang="en-GB"/>
           </a:p>
@@ -3102,7 +3174,7 @@
           <a:p>
             <a:fld id="{E5ACA199-D8D1-4546-831D-8EFC18AA6159}" type="datetimeFigureOut">
               <a:rPr lang="en-GB" smtClean="0"/>
-              <a:t>10/05/2024</a:t>
+              <a:t>17/05/2024</a:t>
             </a:fld>
             <a:endParaRPr lang="en-GB"/>
           </a:p>
@@ -3415,7 +3487,7 @@
           <a:p>
             <a:fld id="{E5ACA199-D8D1-4546-831D-8EFC18AA6159}" type="datetimeFigureOut">
               <a:rPr lang="en-GB" smtClean="0"/>
-              <a:t>10/05/2024</a:t>
+              <a:t>17/05/2024</a:t>
             </a:fld>
             <a:endParaRPr lang="en-GB"/>
           </a:p>
@@ -3704,7 +3776,7 @@
           <a:p>
             <a:fld id="{E5ACA199-D8D1-4546-831D-8EFC18AA6159}" type="datetimeFigureOut">
               <a:rPr lang="en-GB" smtClean="0"/>
-              <a:t>10/05/2024</a:t>
+              <a:t>17/05/2024</a:t>
             </a:fld>
             <a:endParaRPr lang="en-GB"/>
           </a:p>
@@ -3947,7 +4019,7 @@
           <a:p>
             <a:fld id="{E5ACA199-D8D1-4546-831D-8EFC18AA6159}" type="datetimeFigureOut">
               <a:rPr lang="en-GB" smtClean="0"/>
-              <a:t>10/05/2024</a:t>
+              <a:t>17/05/2024</a:t>
             </a:fld>
             <a:endParaRPr lang="en-GB"/>
           </a:p>
@@ -4553,7 +4625,7 @@
           <p:cNvPr id="2" name="Title 1">
             <a:extLst>
               <a:ext uri="{FF2B5EF4-FFF2-40B4-BE49-F238E27FC236}">
-                <a16:creationId xmlns:a16="http://schemas.microsoft.com/office/drawing/2014/main" id="{129ED01F-5074-B08C-828E-F9E3BD65AFDD}"/>
+                <a16:creationId xmlns:a16="http://schemas.microsoft.com/office/drawing/2014/main" id="{E0CE3A65-3FD8-F76A-CADB-D4431626095D}"/>
               </a:ext>
             </a:extLst>
           </p:cNvPr>
@@ -4569,599 +4641,46 @@
           <a:bodyPr/>
           <a:lstStyle/>
           <a:p>
+            <a:endParaRPr lang="en-GB"/>
+          </a:p>
+        </p:txBody>
+      </p:sp>
+      <p:sp>
+        <p:nvSpPr>
+          <p:cNvPr id="3" name="Content Placeholder 2">
+            <a:extLst>
+              <a:ext uri="{FF2B5EF4-FFF2-40B4-BE49-F238E27FC236}">
+                <a16:creationId xmlns:a16="http://schemas.microsoft.com/office/drawing/2014/main" id="{C6462362-EF96-D3D9-45E3-E66E4EA0FCFE}"/>
+              </a:ext>
+            </a:extLst>
+          </p:cNvPr>
+          <p:cNvSpPr>
+            <a:spLocks noGrp="1"/>
+          </p:cNvSpPr>
+          <p:nvPr>
+            <p:ph idx="1"/>
+          </p:nvPr>
+        </p:nvSpPr>
+        <p:spPr/>
+        <p:txBody>
+          <a:bodyPr/>
+          <a:lstStyle/>
+          <a:p>
+            <a:pPr marL="0" indent="0">
+              <a:buNone/>
+            </a:pPr>
             <a:r>
               <a:rPr lang="zh-CN" altLang="en-US" dirty="0"/>
-              <a:t>會計</a:t>
+              <a:t>接下來是針對會計模型的新理解， 之後選擇</a:t>
             </a:r>
             <a:r>
               <a:rPr lang="en-GB" altLang="zh-CN" dirty="0"/>
-              <a:t>OCR Pretrain model</a:t>
-            </a:r>
-            <a:endParaRPr lang="en-GB" dirty="0"/>
-          </a:p>
-        </p:txBody>
-      </p:sp>
-      <p:sp>
-        <p:nvSpPr>
-          <p:cNvPr id="3" name="Content Placeholder 2">
-            <a:extLst>
-              <a:ext uri="{FF2B5EF4-FFF2-40B4-BE49-F238E27FC236}">
-                <a16:creationId xmlns:a16="http://schemas.microsoft.com/office/drawing/2014/main" id="{2C5FE571-7C50-C311-2D4B-3E40ABB6F952}"/>
-              </a:ext>
-            </a:extLst>
-          </p:cNvPr>
-          <p:cNvSpPr>
-            <a:spLocks noGrp="1"/>
-          </p:cNvSpPr>
-          <p:nvPr>
-            <p:ph idx="1"/>
-          </p:nvPr>
-        </p:nvSpPr>
-        <p:spPr>
-          <a:xfrm>
-            <a:off x="838200" y="1825624"/>
-            <a:ext cx="10879318" cy="4791992"/>
-          </a:xfrm>
-        </p:spPr>
-        <p:txBody>
-          <a:bodyPr>
-            <a:normAutofit fontScale="92500" lnSpcReduction="10000"/>
-          </a:bodyPr>
-          <a:lstStyle/>
-          <a:p>
-            <a:r>
-              <a:rPr lang="en-GB" altLang="zh-CN" b="1" dirty="0">
-                <a:solidFill>
-                  <a:srgbClr val="1F2328"/>
-                </a:solidFill>
-                <a:latin typeface="-apple-system"/>
-              </a:rPr>
-              <a:t>Dataset</a:t>
-            </a:r>
-            <a:r>
-              <a:rPr lang="zh-CN" altLang="en-US" b="1" dirty="0">
-                <a:solidFill>
-                  <a:srgbClr val="1F2328"/>
-                </a:solidFill>
-                <a:latin typeface="-apple-system"/>
-              </a:rPr>
-              <a:t>關鍵詞：</a:t>
-            </a:r>
-            <a:r>
-              <a:rPr lang="en-GB" altLang="zh-CN" b="1" dirty="0">
-                <a:solidFill>
-                  <a:srgbClr val="1F2328"/>
-                </a:solidFill>
-                <a:latin typeface="-apple-system"/>
-                <a:hlinkClick r:id="rId2"/>
-              </a:rPr>
-              <a:t>Key Information Extraction (KIE)</a:t>
-            </a:r>
-            <a:r>
-              <a:rPr lang="en-GB" altLang="zh-CN" b="1" dirty="0">
-                <a:solidFill>
-                  <a:srgbClr val="1F2328"/>
-                </a:solidFill>
-                <a:latin typeface="-apple-system"/>
-              </a:rPr>
-              <a:t> from </a:t>
-            </a:r>
-            <a:r>
-              <a:rPr lang="en-GB" altLang="zh-CN" b="1" dirty="0" err="1">
-                <a:solidFill>
-                  <a:srgbClr val="1F2328"/>
-                </a:solidFill>
-                <a:latin typeface="-apple-system"/>
-              </a:rPr>
-              <a:t>Ppstructure</a:t>
-            </a:r>
-            <a:endParaRPr lang="en-GB" altLang="zh-CN" b="1" dirty="0">
-              <a:solidFill>
-                <a:srgbClr val="1F2328"/>
-              </a:solidFill>
-              <a:latin typeface="-apple-system"/>
-            </a:endParaRPr>
-          </a:p>
-          <a:p>
-            <a:r>
-              <a:rPr lang="zh-CN" altLang="en-US" dirty="0">
-                <a:solidFill>
-                  <a:srgbClr val="1F2328"/>
-                </a:solidFill>
-                <a:latin typeface="-apple-system"/>
-              </a:rPr>
-              <a:t>目標：</a:t>
-            </a:r>
-            <a:r>
-              <a:rPr lang="zh-CN" altLang="en-US" b="0" i="0" dirty="0">
-                <a:solidFill>
-                  <a:srgbClr val="1F2328"/>
-                </a:solidFill>
-                <a:effectLst/>
-                <a:latin typeface="-apple-system"/>
-              </a:rPr>
-              <a:t>語義識別</a:t>
-            </a:r>
-            <a:r>
-              <a:rPr lang="zh-TW" altLang="en-US" b="0" i="0" dirty="0">
-                <a:solidFill>
-                  <a:srgbClr val="1F2328"/>
-                </a:solidFill>
-                <a:effectLst/>
-                <a:latin typeface="-apple-system"/>
-              </a:rPr>
-              <a:t> </a:t>
-            </a:r>
-            <a:r>
-              <a:rPr lang="en-US" altLang="zh-TW" b="0" i="0" dirty="0">
-                <a:solidFill>
-                  <a:srgbClr val="1F2328"/>
-                </a:solidFill>
-                <a:effectLst/>
-                <a:latin typeface="-apple-system"/>
-              </a:rPr>
-              <a:t>(</a:t>
-            </a:r>
-            <a:r>
-              <a:rPr lang="en-GB" b="0" i="0" dirty="0">
-                <a:solidFill>
-                  <a:srgbClr val="1F2328"/>
-                </a:solidFill>
-                <a:effectLst/>
-                <a:latin typeface="-apple-system"/>
-              </a:rPr>
-              <a:t>Semantic Entity Recognition, SER) </a:t>
-            </a:r>
-            <a:r>
-              <a:rPr lang="zh-CN" altLang="en-US" dirty="0">
-                <a:solidFill>
-                  <a:srgbClr val="1F2328"/>
-                </a:solidFill>
-                <a:latin typeface="-apple-system"/>
-              </a:rPr>
-              <a:t>以及</a:t>
-            </a:r>
-            <a:r>
-              <a:rPr lang="zh-CN" altLang="en-US" b="0" i="0" dirty="0">
-                <a:solidFill>
-                  <a:srgbClr val="1F2328"/>
-                </a:solidFill>
-                <a:effectLst/>
-                <a:latin typeface="-apple-system"/>
-              </a:rPr>
-              <a:t>關係抽取</a:t>
-            </a:r>
-            <a:r>
-              <a:rPr lang="en-US" altLang="zh-TW" b="0" i="0" dirty="0">
-                <a:solidFill>
-                  <a:srgbClr val="1F2328"/>
-                </a:solidFill>
-                <a:effectLst/>
-                <a:latin typeface="-apple-system"/>
-              </a:rPr>
-              <a:t>(</a:t>
-            </a:r>
-            <a:r>
-              <a:rPr lang="en-GB" b="0" i="0" dirty="0">
-                <a:solidFill>
-                  <a:srgbClr val="1F2328"/>
-                </a:solidFill>
-                <a:effectLst/>
-                <a:latin typeface="-apple-system"/>
-              </a:rPr>
-              <a:t>Relation Extraction, RE) </a:t>
-            </a:r>
-          </a:p>
-          <a:p>
-            <a:pPr lvl="1"/>
-            <a:r>
-              <a:rPr lang="zh-TW" altLang="en-US" dirty="0">
-                <a:solidFill>
-                  <a:srgbClr val="1F2328"/>
-                </a:solidFill>
-                <a:latin typeface="-apple-system"/>
-              </a:rPr>
-              <a:t>基於 </a:t>
-            </a:r>
-            <a:r>
-              <a:rPr lang="en-US" altLang="zh-TW" dirty="0">
-                <a:solidFill>
-                  <a:srgbClr val="1F2328"/>
-                </a:solidFill>
-                <a:latin typeface="-apple-system"/>
-              </a:rPr>
-              <a:t>SER </a:t>
-            </a:r>
-            <a:r>
-              <a:rPr lang="zh-TW" altLang="en-US" dirty="0">
-                <a:solidFill>
-                  <a:srgbClr val="1F2328"/>
-                </a:solidFill>
-                <a:latin typeface="-apple-system"/>
-              </a:rPr>
-              <a:t>任務，可以完成對圖像中的文本</a:t>
-            </a:r>
-            <a:r>
-              <a:rPr lang="zh-CN" altLang="en-US" dirty="0">
-                <a:solidFill>
-                  <a:srgbClr val="1F2328"/>
-                </a:solidFill>
-                <a:latin typeface="-apple-system"/>
-              </a:rPr>
-              <a:t>識別</a:t>
-            </a:r>
-            <a:r>
-              <a:rPr lang="zh-TW" altLang="en-US" dirty="0">
-                <a:solidFill>
-                  <a:srgbClr val="1F2328"/>
-                </a:solidFill>
-                <a:latin typeface="-apple-system"/>
-              </a:rPr>
-              <a:t>與</a:t>
-            </a:r>
-            <a:r>
-              <a:rPr lang="zh-CN" altLang="en-US" dirty="0">
-                <a:solidFill>
-                  <a:srgbClr val="1F2328"/>
-                </a:solidFill>
-                <a:latin typeface="-apple-system"/>
-              </a:rPr>
-              <a:t>分類</a:t>
-            </a:r>
-            <a:r>
-              <a:rPr lang="zh-TW" altLang="en-US" dirty="0">
-                <a:solidFill>
-                  <a:srgbClr val="1F2328"/>
-                </a:solidFill>
-                <a:latin typeface="-apple-system"/>
-              </a:rPr>
-              <a:t>；</a:t>
-            </a:r>
-            <a:endParaRPr lang="en-GB" altLang="zh-TW" dirty="0">
-              <a:solidFill>
-                <a:srgbClr val="1F2328"/>
-              </a:solidFill>
-              <a:latin typeface="-apple-system"/>
-            </a:endParaRPr>
-          </a:p>
-          <a:p>
-            <a:pPr lvl="1"/>
-            <a:r>
-              <a:rPr lang="zh-TW" altLang="en-US" dirty="0">
-                <a:solidFill>
-                  <a:srgbClr val="1F2328"/>
-                </a:solidFill>
-                <a:latin typeface="-apple-system"/>
-              </a:rPr>
-              <a:t>基於 </a:t>
-            </a:r>
-            <a:r>
-              <a:rPr lang="en-US" altLang="zh-TW" dirty="0">
-                <a:solidFill>
-                  <a:srgbClr val="1F2328"/>
-                </a:solidFill>
-                <a:latin typeface="-apple-system"/>
-              </a:rPr>
-              <a:t>RE </a:t>
-            </a:r>
-            <a:r>
-              <a:rPr lang="zh-TW" altLang="en-US" dirty="0">
-                <a:solidFill>
-                  <a:srgbClr val="1F2328"/>
-                </a:solidFill>
-                <a:latin typeface="-apple-system"/>
-              </a:rPr>
-              <a:t>任務，可以完成對圖象中的文本內容的關繫提取，如判斷問題對</a:t>
-            </a:r>
-            <a:r>
-              <a:rPr lang="en-US" altLang="zh-TW" dirty="0">
-                <a:solidFill>
-                  <a:srgbClr val="1F2328"/>
-                </a:solidFill>
-                <a:latin typeface="-apple-system"/>
-              </a:rPr>
-              <a:t>(problem pair)</a:t>
-            </a:r>
-            <a:r>
-              <a:rPr lang="zh-TW" altLang="en-US" dirty="0">
-                <a:solidFill>
-                  <a:srgbClr val="1F2328"/>
-                </a:solidFill>
-                <a:latin typeface="-apple-system"/>
-              </a:rPr>
-              <a:t>。</a:t>
-            </a:r>
-            <a:endParaRPr lang="en-GB" dirty="0">
-              <a:solidFill>
-                <a:srgbClr val="1F2328"/>
-              </a:solidFill>
-              <a:latin typeface="-apple-system"/>
-            </a:endParaRPr>
-          </a:p>
-          <a:p>
-            <a:r>
-              <a:rPr lang="zh-CN" altLang="en-US" dirty="0">
-                <a:solidFill>
-                  <a:srgbClr val="1F2328"/>
-                </a:solidFill>
-                <a:latin typeface="-apple-system"/>
-              </a:rPr>
-              <a:t>實現方法：</a:t>
-            </a:r>
-            <a:r>
-              <a:rPr lang="en-GB" dirty="0">
-                <a:solidFill>
-                  <a:srgbClr val="1F2328"/>
-                </a:solidFill>
-                <a:latin typeface="-apple-system"/>
-              </a:rPr>
-              <a:t>M</a:t>
-            </a:r>
-            <a:r>
-              <a:rPr lang="en-GB" b="0" i="0" dirty="0">
-                <a:solidFill>
-                  <a:srgbClr val="1F2328"/>
-                </a:solidFill>
-                <a:effectLst/>
-                <a:latin typeface="-apple-system"/>
-              </a:rPr>
-              <a:t>ulti-modal methods such as </a:t>
-            </a:r>
-            <a:r>
-              <a:rPr lang="en-GB" b="0" i="0" u="sng" dirty="0" err="1">
-                <a:solidFill>
-                  <a:srgbClr val="1F2328"/>
-                </a:solidFill>
-                <a:effectLst/>
-                <a:latin typeface="-apple-system"/>
-                <a:hlinkClick r:id="rId3"/>
-              </a:rPr>
-              <a:t>LayoutXLM</a:t>
-            </a:r>
-            <a:r>
-              <a:rPr lang="en-GB" b="0" i="0" dirty="0">
-                <a:solidFill>
-                  <a:srgbClr val="1F2328"/>
-                </a:solidFill>
-                <a:effectLst/>
-                <a:latin typeface="-apple-system"/>
-              </a:rPr>
-              <a:t>, VI-</a:t>
-            </a:r>
-            <a:r>
-              <a:rPr lang="en-GB" b="0" i="0" dirty="0" err="1">
-                <a:solidFill>
-                  <a:srgbClr val="1F2328"/>
-                </a:solidFill>
-                <a:effectLst/>
-                <a:latin typeface="-apple-system"/>
-              </a:rPr>
-              <a:t>LayoutXLM</a:t>
-            </a:r>
-            <a:r>
-              <a:rPr lang="en-GB" b="0" i="0" dirty="0">
-                <a:solidFill>
-                  <a:srgbClr val="1F2328"/>
-                </a:solidFill>
-                <a:effectLst/>
-                <a:latin typeface="-apple-system"/>
-              </a:rPr>
-              <a:t>, and PP-OCR inference engine</a:t>
-            </a:r>
-          </a:p>
-          <a:p>
-            <a:r>
-              <a:rPr lang="en-GB" altLang="zh-CN" dirty="0">
-                <a:solidFill>
-                  <a:srgbClr val="1F2328"/>
-                </a:solidFill>
-                <a:latin typeface="-apple-system"/>
-              </a:rPr>
-              <a:t>Inference</a:t>
-            </a:r>
-            <a:r>
-              <a:rPr lang="zh-CN" altLang="en-US" dirty="0">
-                <a:solidFill>
-                  <a:srgbClr val="1F2328"/>
-                </a:solidFill>
-                <a:latin typeface="-apple-system"/>
-              </a:rPr>
-              <a:t>案例：</a:t>
-            </a:r>
-            <a:r>
-              <a:rPr lang="en-US" altLang="zh-CN" dirty="0" err="1">
-                <a:solidFill>
-                  <a:srgbClr val="1F2328"/>
-                </a:solidFill>
-                <a:latin typeface="-apple-system"/>
-              </a:rPr>
-              <a:t>LayoutXLM</a:t>
-            </a:r>
-            <a:r>
-              <a:rPr lang="en-US" altLang="zh-CN" dirty="0">
-                <a:solidFill>
-                  <a:srgbClr val="1F2328"/>
-                </a:solidFill>
-                <a:latin typeface="-apple-system"/>
-              </a:rPr>
-              <a:t>  </a:t>
-            </a:r>
-            <a:r>
-              <a:rPr lang="en-US" altLang="zh-CN" dirty="0">
-                <a:solidFill>
-                  <a:srgbClr val="1F2328"/>
-                </a:solidFill>
-                <a:latin typeface="-apple-system"/>
-                <a:hlinkClick r:id="rId4"/>
-              </a:rPr>
-              <a:t>Torch inference tutorial</a:t>
-            </a:r>
-            <a:endParaRPr lang="en-US" altLang="zh-CN" dirty="0">
-              <a:solidFill>
-                <a:srgbClr val="1F2328"/>
-              </a:solidFill>
-              <a:latin typeface="-apple-system"/>
-            </a:endParaRPr>
-          </a:p>
-          <a:p>
-            <a:r>
-              <a:rPr lang="zh-CN" altLang="en-US" dirty="0">
-                <a:solidFill>
-                  <a:srgbClr val="1F2328"/>
-                </a:solidFill>
-                <a:latin typeface="-apple-system"/>
-              </a:rPr>
-              <a:t>配置文檔</a:t>
-            </a:r>
-            <a:r>
-              <a:rPr lang="en-GB" altLang="zh-CN" dirty="0">
-                <a:solidFill>
-                  <a:srgbClr val="1F2328"/>
-                </a:solidFill>
-                <a:latin typeface="-apple-system"/>
-              </a:rPr>
-              <a:t>(.</a:t>
-            </a:r>
-            <a:r>
-              <a:rPr lang="en-GB" altLang="zh-CN" dirty="0" err="1">
-                <a:solidFill>
-                  <a:srgbClr val="1F2328"/>
-                </a:solidFill>
-                <a:latin typeface="-apple-system"/>
-              </a:rPr>
-              <a:t>yml</a:t>
-            </a:r>
-            <a:r>
-              <a:rPr lang="en-GB" altLang="zh-CN" dirty="0">
-                <a:solidFill>
-                  <a:srgbClr val="1F2328"/>
-                </a:solidFill>
-                <a:latin typeface="-apple-system"/>
-              </a:rPr>
-              <a:t>)</a:t>
-            </a:r>
-            <a:r>
-              <a:rPr lang="zh-CN" altLang="en-US" dirty="0">
-                <a:solidFill>
-                  <a:srgbClr val="1F2328"/>
-                </a:solidFill>
-                <a:latin typeface="-apple-system"/>
-              </a:rPr>
-              <a:t>： </a:t>
-            </a:r>
-            <a:r>
-              <a:rPr lang="en-US" altLang="zh-CN" dirty="0" err="1">
-                <a:solidFill>
-                  <a:srgbClr val="1F2328"/>
-                </a:solidFill>
-                <a:latin typeface="-apple-system"/>
-                <a:hlinkClick r:id="rId5"/>
-              </a:rPr>
-              <a:t>LayoutXLM.yml</a:t>
-            </a:r>
-            <a:endParaRPr lang="en-US" altLang="zh-CN" dirty="0">
-              <a:solidFill>
-                <a:srgbClr val="1F2328"/>
-              </a:solidFill>
-              <a:latin typeface="-apple-system"/>
-            </a:endParaRPr>
-          </a:p>
-          <a:p>
-            <a:r>
-              <a:rPr lang="zh-CN" altLang="en-US" b="0" i="0" dirty="0">
-                <a:solidFill>
-                  <a:srgbClr val="1F2328"/>
-                </a:solidFill>
-                <a:effectLst/>
-                <a:latin typeface="-apple-system"/>
-              </a:rPr>
-              <a:t>開心：從</a:t>
-            </a:r>
-            <a:r>
-              <a:rPr lang="en-US" altLang="zh-CN" dirty="0" err="1">
-                <a:solidFill>
-                  <a:srgbClr val="1F2328"/>
-                </a:solidFill>
-                <a:latin typeface="-apple-system"/>
-              </a:rPr>
-              <a:t>LayoutXLM.yml</a:t>
-            </a:r>
-            <a:r>
-              <a:rPr lang="zh-CN" altLang="en-US" dirty="0">
-                <a:solidFill>
-                  <a:srgbClr val="1F2328"/>
-                </a:solidFill>
-                <a:latin typeface="-apple-system"/>
-              </a:rPr>
-              <a:t>可得知，</a:t>
-            </a:r>
-            <a:r>
-              <a:rPr lang="en-GB" altLang="zh-CN" dirty="0">
-                <a:solidFill>
-                  <a:srgbClr val="1F2328"/>
-                </a:solidFill>
-                <a:latin typeface="-apple-system"/>
-              </a:rPr>
-              <a:t>training</a:t>
-            </a:r>
-            <a:r>
-              <a:rPr lang="zh-CN" altLang="en-US" dirty="0">
-                <a:solidFill>
-                  <a:srgbClr val="1F2328"/>
-                </a:solidFill>
-                <a:latin typeface="-apple-system"/>
-              </a:rPr>
-              <a:t>的時候也是</a:t>
-            </a:r>
-            <a:r>
-              <a:rPr lang="en-US" altLang="zh-CN" dirty="0" err="1"/>
-              <a:t>simple_dataset</a:t>
-            </a:r>
-            <a:r>
-              <a:rPr lang="en-GB" dirty="0"/>
-              <a:t>.</a:t>
-            </a:r>
-            <a:r>
-              <a:rPr lang="en-GB" dirty="0" err="1"/>
-              <a:t>py</a:t>
-            </a:r>
-            <a:r>
-              <a:rPr lang="en-GB" dirty="0"/>
-              <a:t> </a:t>
+              <a:t>pretrain model</a:t>
             </a:r>
             <a:r>
               <a:rPr lang="zh-CN" altLang="en-US" dirty="0"/>
-              <a:t>作爲</a:t>
-            </a:r>
-            <a:r>
-              <a:rPr lang="en-GB" altLang="zh-CN" dirty="0" err="1"/>
-              <a:t>DataLoader</a:t>
-            </a:r>
-            <a:endParaRPr lang="en-GB" altLang="zh-CN" b="1" dirty="0">
-              <a:solidFill>
-                <a:srgbClr val="1F2328"/>
-              </a:solidFill>
-              <a:latin typeface="-apple-system"/>
-            </a:endParaRPr>
-          </a:p>
-          <a:p>
-            <a:endParaRPr lang="en-GB" altLang="zh-CN" b="1" dirty="0">
-              <a:solidFill>
-                <a:srgbClr val="1F2328"/>
-              </a:solidFill>
-              <a:latin typeface="-apple-system"/>
-            </a:endParaRPr>
-          </a:p>
-          <a:p>
-            <a:endParaRPr lang="en-GB" i="0" dirty="0">
-              <a:solidFill>
-                <a:srgbClr val="1F2328"/>
-              </a:solidFill>
-              <a:effectLst/>
-              <a:latin typeface="-apple-system"/>
-            </a:endParaRPr>
-          </a:p>
-          <a:p>
+              <a:t>的方向</a:t>
+            </a:r>
             <a:endParaRPr lang="en-GB" dirty="0"/>
           </a:p>
         </p:txBody>
@@ -5169,7 +4688,7 @@
     </p:spTree>
     <p:extLst>
       <p:ext uri="{BB962C8B-B14F-4D97-AF65-F5344CB8AC3E}">
-        <p14:creationId xmlns:p14="http://schemas.microsoft.com/office/powerpoint/2010/main" val="2610538483"/>
+        <p14:creationId xmlns:p14="http://schemas.microsoft.com/office/powerpoint/2010/main" val="1086669505"/>
       </p:ext>
     </p:extLst>
   </p:cSld>
@@ -5201,7 +4720,7 @@
           <p:cNvPr id="2" name="Title 1">
             <a:extLst>
               <a:ext uri="{FF2B5EF4-FFF2-40B4-BE49-F238E27FC236}">
-                <a16:creationId xmlns:a16="http://schemas.microsoft.com/office/drawing/2014/main" id="{E23118D8-302B-41C5-F1FB-93C395C6A417}"/>
+                <a16:creationId xmlns:a16="http://schemas.microsoft.com/office/drawing/2014/main" id="{129ED01F-5074-B08C-828E-F9E3BD65AFDD}"/>
               </a:ext>
             </a:extLst>
           </p:cNvPr>
@@ -5217,7 +4736,15 @@
           <a:bodyPr/>
           <a:lstStyle/>
           <a:p>
-            <a:endParaRPr lang="en-GB"/>
+            <a:r>
+              <a:rPr lang="zh-CN" altLang="en-US" dirty="0"/>
+              <a:t>會計</a:t>
+            </a:r>
+            <a:r>
+              <a:rPr lang="en-GB" altLang="zh-CN" dirty="0"/>
+              <a:t>OCR Pretrain model</a:t>
+            </a:r>
+            <a:endParaRPr lang="en-GB" dirty="0"/>
           </a:p>
         </p:txBody>
       </p:sp>
@@ -5226,7 +4753,7 @@
           <p:cNvPr id="3" name="Content Placeholder 2">
             <a:extLst>
               <a:ext uri="{FF2B5EF4-FFF2-40B4-BE49-F238E27FC236}">
-                <a16:creationId xmlns:a16="http://schemas.microsoft.com/office/drawing/2014/main" id="{9304DB25-E5F9-653F-DCED-76344490A4BE}"/>
+                <a16:creationId xmlns:a16="http://schemas.microsoft.com/office/drawing/2014/main" id="{2C5FE571-7C50-C311-2D4B-3E40ABB6F952}"/>
               </a:ext>
             </a:extLst>
           </p:cNvPr>
@@ -5237,32 +4764,579 @@
             <p:ph idx="1"/>
           </p:nvPr>
         </p:nvSpPr>
-        <p:spPr/>
+        <p:spPr>
+          <a:xfrm>
+            <a:off x="838200" y="1825624"/>
+            <a:ext cx="10879318" cy="4791992"/>
+          </a:xfrm>
+        </p:spPr>
         <p:txBody>
           <a:bodyPr>
-            <a:normAutofit/>
+            <a:normAutofit fontScale="92500" lnSpcReduction="10000"/>
           </a:bodyPr>
           <a:lstStyle/>
           <a:p>
-            <a:pPr marL="0" indent="0" algn="ctr">
-              <a:buNone/>
-            </a:pPr>
-            <a:r>
-              <a:rPr lang="zh-CN" altLang="en-US" sz="4800" dirty="0"/>
-              <a:t>接下來只是一些幫助理解的</a:t>
-            </a:r>
-            <a:r>
-              <a:rPr lang="en-GB" altLang="zh-CN" sz="4800" dirty="0"/>
-              <a:t>notes</a:t>
-            </a:r>
-            <a:endParaRPr lang="en-GB" sz="4800" dirty="0"/>
+            <a:r>
+              <a:rPr lang="en-GB" altLang="zh-CN" b="1" dirty="0">
+                <a:solidFill>
+                  <a:srgbClr val="1F2328"/>
+                </a:solidFill>
+                <a:latin typeface="-apple-system"/>
+              </a:rPr>
+              <a:t>Dataset</a:t>
+            </a:r>
+            <a:r>
+              <a:rPr lang="zh-CN" altLang="en-US" b="1" dirty="0">
+                <a:solidFill>
+                  <a:srgbClr val="1F2328"/>
+                </a:solidFill>
+                <a:latin typeface="-apple-system"/>
+              </a:rPr>
+              <a:t>關鍵詞：</a:t>
+            </a:r>
+            <a:r>
+              <a:rPr lang="en-GB" altLang="zh-CN" b="1" dirty="0">
+                <a:solidFill>
+                  <a:srgbClr val="1F2328"/>
+                </a:solidFill>
+                <a:latin typeface="-apple-system"/>
+                <a:hlinkClick r:id="rId2"/>
+              </a:rPr>
+              <a:t>Key Information Extraction (KIE)</a:t>
+            </a:r>
+            <a:r>
+              <a:rPr lang="en-GB" altLang="zh-CN" b="1" dirty="0">
+                <a:solidFill>
+                  <a:srgbClr val="1F2328"/>
+                </a:solidFill>
+                <a:latin typeface="-apple-system"/>
+              </a:rPr>
+              <a:t> from </a:t>
+            </a:r>
+            <a:r>
+              <a:rPr lang="en-GB" altLang="zh-CN" b="1" dirty="0" err="1">
+                <a:solidFill>
+                  <a:srgbClr val="1F2328"/>
+                </a:solidFill>
+                <a:latin typeface="-apple-system"/>
+              </a:rPr>
+              <a:t>Ppstructure</a:t>
+            </a:r>
+            <a:endParaRPr lang="en-GB" altLang="zh-CN" b="1" dirty="0">
+              <a:solidFill>
+                <a:srgbClr val="1F2328"/>
+              </a:solidFill>
+              <a:latin typeface="-apple-system"/>
+            </a:endParaRPr>
+          </a:p>
+          <a:p>
+            <a:r>
+              <a:rPr lang="zh-CN" altLang="en-US" dirty="0">
+                <a:solidFill>
+                  <a:srgbClr val="1F2328"/>
+                </a:solidFill>
+                <a:latin typeface="-apple-system"/>
+              </a:rPr>
+              <a:t>目標：</a:t>
+            </a:r>
+            <a:r>
+              <a:rPr lang="zh-CN" altLang="en-US" b="0" i="0" dirty="0">
+                <a:solidFill>
+                  <a:srgbClr val="1F2328"/>
+                </a:solidFill>
+                <a:effectLst/>
+                <a:latin typeface="-apple-system"/>
+              </a:rPr>
+              <a:t>語義識別</a:t>
+            </a:r>
+            <a:r>
+              <a:rPr lang="zh-TW" altLang="en-US" b="0" i="0" dirty="0">
+                <a:solidFill>
+                  <a:srgbClr val="1F2328"/>
+                </a:solidFill>
+                <a:effectLst/>
+                <a:latin typeface="-apple-system"/>
+              </a:rPr>
+              <a:t> </a:t>
+            </a:r>
+            <a:r>
+              <a:rPr lang="en-US" altLang="zh-TW" b="0" i="0" dirty="0">
+                <a:solidFill>
+                  <a:srgbClr val="1F2328"/>
+                </a:solidFill>
+                <a:effectLst/>
+                <a:latin typeface="-apple-system"/>
+              </a:rPr>
+              <a:t>(</a:t>
+            </a:r>
+            <a:r>
+              <a:rPr lang="en-GB" b="0" i="0" dirty="0">
+                <a:solidFill>
+                  <a:srgbClr val="1F2328"/>
+                </a:solidFill>
+                <a:effectLst/>
+                <a:latin typeface="-apple-system"/>
+              </a:rPr>
+              <a:t>Semantic Entity Recognition, SER) </a:t>
+            </a:r>
+            <a:r>
+              <a:rPr lang="zh-CN" altLang="en-US" dirty="0">
+                <a:solidFill>
+                  <a:srgbClr val="1F2328"/>
+                </a:solidFill>
+                <a:latin typeface="-apple-system"/>
+              </a:rPr>
+              <a:t>以及</a:t>
+            </a:r>
+            <a:r>
+              <a:rPr lang="zh-CN" altLang="en-US" b="0" i="0" dirty="0">
+                <a:solidFill>
+                  <a:srgbClr val="1F2328"/>
+                </a:solidFill>
+                <a:effectLst/>
+                <a:latin typeface="-apple-system"/>
+              </a:rPr>
+              <a:t>關係抽取</a:t>
+            </a:r>
+            <a:r>
+              <a:rPr lang="en-US" altLang="zh-TW" b="0" i="0" dirty="0">
+                <a:solidFill>
+                  <a:srgbClr val="1F2328"/>
+                </a:solidFill>
+                <a:effectLst/>
+                <a:latin typeface="-apple-system"/>
+              </a:rPr>
+              <a:t>(</a:t>
+            </a:r>
+            <a:r>
+              <a:rPr lang="en-GB" b="0" i="0" dirty="0">
+                <a:solidFill>
+                  <a:srgbClr val="1F2328"/>
+                </a:solidFill>
+                <a:effectLst/>
+                <a:latin typeface="-apple-system"/>
+              </a:rPr>
+              <a:t>Relation Extraction, RE) </a:t>
+            </a:r>
+          </a:p>
+          <a:p>
+            <a:pPr lvl="1"/>
+            <a:r>
+              <a:rPr lang="zh-TW" altLang="en-US" dirty="0">
+                <a:solidFill>
+                  <a:srgbClr val="1F2328"/>
+                </a:solidFill>
+                <a:latin typeface="-apple-system"/>
+              </a:rPr>
+              <a:t>基於 </a:t>
+            </a:r>
+            <a:r>
+              <a:rPr lang="en-US" altLang="zh-TW" dirty="0">
+                <a:solidFill>
+                  <a:srgbClr val="1F2328"/>
+                </a:solidFill>
+                <a:latin typeface="-apple-system"/>
+              </a:rPr>
+              <a:t>SER </a:t>
+            </a:r>
+            <a:r>
+              <a:rPr lang="zh-TW" altLang="en-US" dirty="0">
+                <a:solidFill>
+                  <a:srgbClr val="1F2328"/>
+                </a:solidFill>
+                <a:latin typeface="-apple-system"/>
+              </a:rPr>
+              <a:t>任務，可以完成對圖像中的文本</a:t>
+            </a:r>
+            <a:r>
+              <a:rPr lang="zh-CN" altLang="en-US" dirty="0">
+                <a:solidFill>
+                  <a:srgbClr val="1F2328"/>
+                </a:solidFill>
+                <a:latin typeface="-apple-system"/>
+              </a:rPr>
+              <a:t>識別</a:t>
+            </a:r>
+            <a:r>
+              <a:rPr lang="zh-TW" altLang="en-US" dirty="0">
+                <a:solidFill>
+                  <a:srgbClr val="1F2328"/>
+                </a:solidFill>
+                <a:latin typeface="-apple-system"/>
+              </a:rPr>
+              <a:t>與</a:t>
+            </a:r>
+            <a:r>
+              <a:rPr lang="zh-CN" altLang="en-US" dirty="0">
+                <a:solidFill>
+                  <a:srgbClr val="1F2328"/>
+                </a:solidFill>
+                <a:latin typeface="-apple-system"/>
+              </a:rPr>
+              <a:t>分類</a:t>
+            </a:r>
+            <a:r>
+              <a:rPr lang="zh-TW" altLang="en-US" dirty="0">
+                <a:solidFill>
+                  <a:srgbClr val="1F2328"/>
+                </a:solidFill>
+                <a:latin typeface="-apple-system"/>
+              </a:rPr>
+              <a:t>；</a:t>
+            </a:r>
+            <a:endParaRPr lang="en-GB" altLang="zh-TW" dirty="0">
+              <a:solidFill>
+                <a:srgbClr val="1F2328"/>
+              </a:solidFill>
+              <a:latin typeface="-apple-system"/>
+            </a:endParaRPr>
+          </a:p>
+          <a:p>
+            <a:pPr lvl="1"/>
+            <a:r>
+              <a:rPr lang="zh-TW" altLang="en-US" dirty="0">
+                <a:solidFill>
+                  <a:srgbClr val="1F2328"/>
+                </a:solidFill>
+                <a:latin typeface="-apple-system"/>
+              </a:rPr>
+              <a:t>基於 </a:t>
+            </a:r>
+            <a:r>
+              <a:rPr lang="en-US" altLang="zh-TW" dirty="0">
+                <a:solidFill>
+                  <a:srgbClr val="1F2328"/>
+                </a:solidFill>
+                <a:latin typeface="-apple-system"/>
+              </a:rPr>
+              <a:t>RE </a:t>
+            </a:r>
+            <a:r>
+              <a:rPr lang="zh-TW" altLang="en-US" dirty="0">
+                <a:solidFill>
+                  <a:srgbClr val="1F2328"/>
+                </a:solidFill>
+                <a:latin typeface="-apple-system"/>
+              </a:rPr>
+              <a:t>任務，可以完成對圖象中的文本內容的關繫提取，如判斷問題對</a:t>
+            </a:r>
+            <a:r>
+              <a:rPr lang="en-US" altLang="zh-TW" dirty="0">
+                <a:solidFill>
+                  <a:srgbClr val="1F2328"/>
+                </a:solidFill>
+                <a:latin typeface="-apple-system"/>
+              </a:rPr>
+              <a:t>(problem pair)</a:t>
+            </a:r>
+            <a:r>
+              <a:rPr lang="zh-TW" altLang="en-US" dirty="0">
+                <a:solidFill>
+                  <a:srgbClr val="1F2328"/>
+                </a:solidFill>
+                <a:latin typeface="-apple-system"/>
+              </a:rPr>
+              <a:t>。</a:t>
+            </a:r>
+            <a:endParaRPr lang="en-GB" dirty="0">
+              <a:solidFill>
+                <a:srgbClr val="1F2328"/>
+              </a:solidFill>
+              <a:latin typeface="-apple-system"/>
+            </a:endParaRPr>
+          </a:p>
+          <a:p>
+            <a:r>
+              <a:rPr lang="zh-CN" altLang="en-US" dirty="0">
+                <a:solidFill>
+                  <a:srgbClr val="1F2328"/>
+                </a:solidFill>
+                <a:latin typeface="-apple-system"/>
+              </a:rPr>
+              <a:t>實現方法：</a:t>
+            </a:r>
+            <a:r>
+              <a:rPr lang="en-GB" dirty="0">
+                <a:solidFill>
+                  <a:srgbClr val="1F2328"/>
+                </a:solidFill>
+                <a:latin typeface="-apple-system"/>
+              </a:rPr>
+              <a:t>M</a:t>
+            </a:r>
+            <a:r>
+              <a:rPr lang="en-GB" b="0" i="0" dirty="0">
+                <a:solidFill>
+                  <a:srgbClr val="1F2328"/>
+                </a:solidFill>
+                <a:effectLst/>
+                <a:latin typeface="-apple-system"/>
+              </a:rPr>
+              <a:t>ulti-modal methods such as </a:t>
+            </a:r>
+            <a:r>
+              <a:rPr lang="en-GB" b="0" i="0" u="sng" dirty="0" err="1">
+                <a:solidFill>
+                  <a:srgbClr val="1F2328"/>
+                </a:solidFill>
+                <a:effectLst/>
+                <a:latin typeface="-apple-system"/>
+                <a:hlinkClick r:id="rId3"/>
+              </a:rPr>
+              <a:t>LayoutXLM</a:t>
+            </a:r>
+            <a:r>
+              <a:rPr lang="en-GB" b="0" i="0" dirty="0">
+                <a:solidFill>
+                  <a:srgbClr val="1F2328"/>
+                </a:solidFill>
+                <a:effectLst/>
+                <a:latin typeface="-apple-system"/>
+              </a:rPr>
+              <a:t>, VI-</a:t>
+            </a:r>
+            <a:r>
+              <a:rPr lang="en-GB" b="0" i="0" dirty="0" err="1">
+                <a:solidFill>
+                  <a:srgbClr val="1F2328"/>
+                </a:solidFill>
+                <a:effectLst/>
+                <a:latin typeface="-apple-system"/>
+              </a:rPr>
+              <a:t>LayoutXLM</a:t>
+            </a:r>
+            <a:r>
+              <a:rPr lang="en-GB" b="0" i="0" dirty="0">
+                <a:solidFill>
+                  <a:srgbClr val="1F2328"/>
+                </a:solidFill>
+                <a:effectLst/>
+                <a:latin typeface="-apple-system"/>
+              </a:rPr>
+              <a:t>, and PP-OCR inference engine</a:t>
+            </a:r>
+          </a:p>
+          <a:p>
+            <a:r>
+              <a:rPr lang="en-GB" altLang="zh-CN" dirty="0">
+                <a:solidFill>
+                  <a:srgbClr val="1F2328"/>
+                </a:solidFill>
+                <a:latin typeface="-apple-system"/>
+              </a:rPr>
+              <a:t>Inference</a:t>
+            </a:r>
+            <a:r>
+              <a:rPr lang="zh-CN" altLang="en-US" dirty="0">
+                <a:solidFill>
+                  <a:srgbClr val="1F2328"/>
+                </a:solidFill>
+                <a:latin typeface="-apple-system"/>
+              </a:rPr>
+              <a:t>案例：</a:t>
+            </a:r>
+            <a:r>
+              <a:rPr lang="en-US" altLang="zh-CN" dirty="0" err="1">
+                <a:solidFill>
+                  <a:srgbClr val="1F2328"/>
+                </a:solidFill>
+                <a:latin typeface="-apple-system"/>
+              </a:rPr>
+              <a:t>LayoutXLM</a:t>
+            </a:r>
+            <a:r>
+              <a:rPr lang="en-US" altLang="zh-CN" dirty="0">
+                <a:solidFill>
+                  <a:srgbClr val="1F2328"/>
+                </a:solidFill>
+                <a:latin typeface="-apple-system"/>
+              </a:rPr>
+              <a:t>  </a:t>
+            </a:r>
+            <a:r>
+              <a:rPr lang="en-US" altLang="zh-CN" dirty="0">
+                <a:solidFill>
+                  <a:srgbClr val="1F2328"/>
+                </a:solidFill>
+                <a:latin typeface="-apple-system"/>
+                <a:hlinkClick r:id="rId4"/>
+              </a:rPr>
+              <a:t>Torch inference tutorial</a:t>
+            </a:r>
+            <a:endParaRPr lang="en-US" altLang="zh-CN" dirty="0">
+              <a:solidFill>
+                <a:srgbClr val="1F2328"/>
+              </a:solidFill>
+              <a:latin typeface="-apple-system"/>
+            </a:endParaRPr>
+          </a:p>
+          <a:p>
+            <a:r>
+              <a:rPr lang="zh-CN" altLang="en-US" dirty="0">
+                <a:solidFill>
+                  <a:srgbClr val="1F2328"/>
+                </a:solidFill>
+                <a:latin typeface="-apple-system"/>
+              </a:rPr>
+              <a:t>配置文檔</a:t>
+            </a:r>
+            <a:r>
+              <a:rPr lang="en-GB" altLang="zh-CN" dirty="0">
+                <a:solidFill>
+                  <a:srgbClr val="1F2328"/>
+                </a:solidFill>
+                <a:latin typeface="-apple-system"/>
+              </a:rPr>
+              <a:t>(.</a:t>
+            </a:r>
+            <a:r>
+              <a:rPr lang="en-GB" altLang="zh-CN" dirty="0" err="1">
+                <a:solidFill>
+                  <a:srgbClr val="1F2328"/>
+                </a:solidFill>
+                <a:latin typeface="-apple-system"/>
+              </a:rPr>
+              <a:t>yml</a:t>
+            </a:r>
+            <a:r>
+              <a:rPr lang="en-GB" altLang="zh-CN" dirty="0">
+                <a:solidFill>
+                  <a:srgbClr val="1F2328"/>
+                </a:solidFill>
+                <a:latin typeface="-apple-system"/>
+              </a:rPr>
+              <a:t>)</a:t>
+            </a:r>
+            <a:r>
+              <a:rPr lang="zh-CN" altLang="en-US" dirty="0">
+                <a:solidFill>
+                  <a:srgbClr val="1F2328"/>
+                </a:solidFill>
+                <a:latin typeface="-apple-system"/>
+              </a:rPr>
+              <a:t>： </a:t>
+            </a:r>
+            <a:r>
+              <a:rPr lang="en-US" altLang="zh-CN" dirty="0" err="1">
+                <a:solidFill>
+                  <a:srgbClr val="1F2328"/>
+                </a:solidFill>
+                <a:latin typeface="-apple-system"/>
+                <a:hlinkClick r:id="rId5"/>
+              </a:rPr>
+              <a:t>LayoutXLM.yml</a:t>
+            </a:r>
+            <a:endParaRPr lang="en-US" altLang="zh-CN" dirty="0">
+              <a:solidFill>
+                <a:srgbClr val="1F2328"/>
+              </a:solidFill>
+              <a:latin typeface="-apple-system"/>
+            </a:endParaRPr>
+          </a:p>
+          <a:p>
+            <a:r>
+              <a:rPr lang="zh-CN" altLang="en-US" b="0" i="0" dirty="0">
+                <a:solidFill>
+                  <a:srgbClr val="1F2328"/>
+                </a:solidFill>
+                <a:effectLst/>
+                <a:latin typeface="-apple-system"/>
+              </a:rPr>
+              <a:t>開心：從</a:t>
+            </a:r>
+            <a:r>
+              <a:rPr lang="en-US" altLang="zh-CN" dirty="0" err="1">
+                <a:solidFill>
+                  <a:srgbClr val="1F2328"/>
+                </a:solidFill>
+                <a:latin typeface="-apple-system"/>
+              </a:rPr>
+              <a:t>LayoutXLM.yml</a:t>
+            </a:r>
+            <a:r>
+              <a:rPr lang="zh-CN" altLang="en-US" dirty="0">
+                <a:solidFill>
+                  <a:srgbClr val="1F2328"/>
+                </a:solidFill>
+                <a:latin typeface="-apple-system"/>
+              </a:rPr>
+              <a:t>可得知，</a:t>
+            </a:r>
+            <a:r>
+              <a:rPr lang="en-GB" altLang="zh-CN" dirty="0">
+                <a:solidFill>
+                  <a:srgbClr val="1F2328"/>
+                </a:solidFill>
+                <a:latin typeface="-apple-system"/>
+              </a:rPr>
+              <a:t>training</a:t>
+            </a:r>
+            <a:r>
+              <a:rPr lang="zh-CN" altLang="en-US" dirty="0">
+                <a:solidFill>
+                  <a:srgbClr val="1F2328"/>
+                </a:solidFill>
+                <a:latin typeface="-apple-system"/>
+              </a:rPr>
+              <a:t>的時候也是</a:t>
+            </a:r>
+            <a:r>
+              <a:rPr lang="en-US" altLang="zh-CN" dirty="0" err="1"/>
+              <a:t>simple_dataset</a:t>
+            </a:r>
+            <a:r>
+              <a:rPr lang="en-GB" dirty="0"/>
+              <a:t>.</a:t>
+            </a:r>
+            <a:r>
+              <a:rPr lang="en-GB" dirty="0" err="1"/>
+              <a:t>py</a:t>
+            </a:r>
+            <a:r>
+              <a:rPr lang="en-GB" dirty="0"/>
+              <a:t> </a:t>
+            </a:r>
+            <a:r>
+              <a:rPr lang="zh-CN" altLang="en-US" dirty="0"/>
+              <a:t>作爲</a:t>
+            </a:r>
+            <a:r>
+              <a:rPr lang="en-GB" altLang="zh-CN" dirty="0" err="1"/>
+              <a:t>DataLoader</a:t>
+            </a:r>
+            <a:endParaRPr lang="en-GB" altLang="zh-CN" b="1" dirty="0">
+              <a:solidFill>
+                <a:srgbClr val="1F2328"/>
+              </a:solidFill>
+              <a:latin typeface="-apple-system"/>
+            </a:endParaRPr>
+          </a:p>
+          <a:p>
+            <a:endParaRPr lang="en-GB" altLang="zh-CN" b="1" dirty="0">
+              <a:solidFill>
+                <a:srgbClr val="1F2328"/>
+              </a:solidFill>
+              <a:latin typeface="-apple-system"/>
+            </a:endParaRPr>
+          </a:p>
+          <a:p>
+            <a:endParaRPr lang="en-GB" i="0" dirty="0">
+              <a:solidFill>
+                <a:srgbClr val="1F2328"/>
+              </a:solidFill>
+              <a:effectLst/>
+              <a:latin typeface="-apple-system"/>
+            </a:endParaRPr>
+          </a:p>
+          <a:p>
+            <a:endParaRPr lang="en-GB" dirty="0"/>
           </a:p>
         </p:txBody>
       </p:sp>
     </p:spTree>
     <p:extLst>
       <p:ext uri="{BB962C8B-B14F-4D97-AF65-F5344CB8AC3E}">
-        <p14:creationId xmlns:p14="http://schemas.microsoft.com/office/powerpoint/2010/main" val="4047682127"/>
+        <p14:creationId xmlns:p14="http://schemas.microsoft.com/office/powerpoint/2010/main" val="2610538483"/>
       </p:ext>
     </p:extLst>
   </p:cSld>
@@ -5294,7 +5368,7 @@
           <p:cNvPr id="2" name="Title 1">
             <a:extLst>
               <a:ext uri="{FF2B5EF4-FFF2-40B4-BE49-F238E27FC236}">
-                <a16:creationId xmlns:a16="http://schemas.microsoft.com/office/drawing/2014/main" id="{D62AF5D3-4CFF-9BE6-EBBF-60D0371E041B}"/>
+                <a16:creationId xmlns:a16="http://schemas.microsoft.com/office/drawing/2014/main" id="{E23118D8-302B-41C5-F1FB-93C395C6A417}"/>
               </a:ext>
             </a:extLst>
           </p:cNvPr>
@@ -5310,35 +5384,7 @@
           <a:bodyPr/>
           <a:lstStyle/>
           <a:p>
-            <a:r>
-              <a:rPr lang="en-GB" dirty="0"/>
-              <a:t>base_model.py</a:t>
-            </a:r>
-            <a:r>
-              <a:rPr lang="zh-CN" altLang="en-US" dirty="0"/>
-              <a:t>讀</a:t>
-            </a:r>
-            <a:r>
-              <a:rPr lang="en-GB" altLang="zh-CN" dirty="0"/>
-              <a:t>.</a:t>
-            </a:r>
-            <a:r>
-              <a:rPr lang="en-GB" altLang="zh-CN" dirty="0" err="1"/>
-              <a:t>yml</a:t>
-            </a:r>
-            <a:r>
-              <a:rPr lang="en-GB" altLang="zh-CN" dirty="0"/>
-              <a:t> </a:t>
-            </a:r>
-            <a:r>
-              <a:rPr lang="zh-CN" altLang="en-US" dirty="0"/>
-              <a:t>文檔，轉成</a:t>
-            </a:r>
-            <a:r>
-              <a:rPr lang="en-GB" altLang="zh-CN" dirty="0" err="1"/>
-              <a:t>pytorch</a:t>
-            </a:r>
-            <a:endParaRPr lang="en-GB" dirty="0"/>
+            <a:endParaRPr lang="en-GB"/>
           </a:p>
         </p:txBody>
       </p:sp>
@@ -5347,7 +5393,7 @@
           <p:cNvPr id="3" name="Content Placeholder 2">
             <a:extLst>
               <a:ext uri="{FF2B5EF4-FFF2-40B4-BE49-F238E27FC236}">
-                <a16:creationId xmlns:a16="http://schemas.microsoft.com/office/drawing/2014/main" id="{F575F9DD-B0FF-6DA0-4F8D-DEDEE0D73877}"/>
+                <a16:creationId xmlns:a16="http://schemas.microsoft.com/office/drawing/2014/main" id="{9304DB25-E5F9-653F-DCED-76344490A4BE}"/>
               </a:ext>
             </a:extLst>
           </p:cNvPr>
@@ -5360,176 +5406,8 @@
         </p:nvSpPr>
         <p:spPr/>
         <p:txBody>
-          <a:bodyPr/>
-          <a:lstStyle/>
-          <a:p>
-            <a:r>
-              <a:rPr lang="en-GB" dirty="0"/>
-              <a:t>model\modeling\architectures\base_model.py </a:t>
-            </a:r>
-            <a:r>
-              <a:rPr lang="zh-CN" altLang="en-US" dirty="0"/>
-              <a:t>缺少 </a:t>
-            </a:r>
-            <a:r>
-              <a:rPr lang="en-GB" sz="2000" b="0" dirty="0">
-                <a:effectLst/>
-                <a:latin typeface="Consolas" panose="020B0609020204030204" pitchFamily="49" charset="0"/>
-              </a:rPr>
-              <a:t>self._</a:t>
-            </a:r>
-            <a:r>
-              <a:rPr lang="en-GB" sz="2000" b="0" dirty="0" err="1">
-                <a:effectLst/>
-                <a:latin typeface="Consolas" panose="020B0609020204030204" pitchFamily="49" charset="0"/>
-              </a:rPr>
-              <a:t>initialize_weights</a:t>
-            </a:r>
-            <a:r>
-              <a:rPr lang="en-GB" sz="2000" b="0" dirty="0">
-                <a:effectLst/>
-                <a:latin typeface="Consolas" panose="020B0609020204030204" pitchFamily="49" charset="0"/>
-              </a:rPr>
-              <a:t>()</a:t>
-            </a:r>
-            <a:r>
-              <a:rPr lang="zh-CN" altLang="en-US" sz="2000" b="0" dirty="0">
-                <a:effectLst/>
-                <a:latin typeface="Consolas" panose="020B0609020204030204" pitchFamily="49" charset="0"/>
-              </a:rPr>
-              <a:t>， </a:t>
-            </a:r>
-            <a:endParaRPr lang="en-GB" altLang="zh-CN" sz="2000" b="0" dirty="0">
-              <a:effectLst/>
-              <a:latin typeface="Consolas" panose="020B0609020204030204" pitchFamily="49" charset="0"/>
-            </a:endParaRPr>
-          </a:p>
-          <a:p>
-            <a:pPr marL="0" indent="0">
-              <a:buNone/>
-            </a:pPr>
-            <a:r>
-              <a:rPr lang="zh-CN" altLang="en-US" sz="2000" dirty="0">
-                <a:latin typeface="Consolas" panose="020B0609020204030204" pitchFamily="49" charset="0"/>
-              </a:rPr>
-              <a:t>以及</a:t>
-            </a:r>
-            <a:r>
-              <a:rPr lang="en-GB" sz="2000" b="0" dirty="0">
-                <a:effectLst/>
-                <a:latin typeface="Consolas" panose="020B0609020204030204" pitchFamily="49" charset="0"/>
-              </a:rPr>
-              <a:t>if </a:t>
-            </a:r>
-            <a:r>
-              <a:rPr lang="en-GB" sz="2000" b="0" dirty="0" err="1">
-                <a:effectLst/>
-                <a:latin typeface="Consolas" panose="020B0609020204030204" pitchFamily="49" charset="0"/>
-              </a:rPr>
-              <a:t>self.use_transform</a:t>
-            </a:r>
-            <a:r>
-              <a:rPr lang="en-GB" sz="2000" b="0" dirty="0">
-                <a:effectLst/>
-                <a:latin typeface="Consolas" panose="020B0609020204030204" pitchFamily="49" charset="0"/>
-              </a:rPr>
-              <a:t>:</a:t>
-            </a:r>
-          </a:p>
-          <a:p>
-            <a:pPr marL="0" indent="0">
-              <a:buNone/>
-            </a:pPr>
-            <a:r>
-              <a:rPr lang="en-GB" sz="2000" b="0" dirty="0">
-                <a:effectLst/>
-                <a:latin typeface="Consolas" panose="020B0609020204030204" pitchFamily="49" charset="0"/>
-              </a:rPr>
-              <a:t>        x = </a:t>
-            </a:r>
-            <a:r>
-              <a:rPr lang="en-GB" sz="2000" b="0" dirty="0" err="1">
-                <a:effectLst/>
-                <a:latin typeface="Consolas" panose="020B0609020204030204" pitchFamily="49" charset="0"/>
-              </a:rPr>
-              <a:t>self.transform</a:t>
-            </a:r>
-            <a:r>
-              <a:rPr lang="en-GB" sz="2000" b="0" dirty="0">
-                <a:effectLst/>
-                <a:latin typeface="Consolas" panose="020B0609020204030204" pitchFamily="49" charset="0"/>
-              </a:rPr>
-              <a:t>(x)</a:t>
-            </a:r>
-          </a:p>
-          <a:p>
-            <a:endParaRPr lang="en-GB" altLang="zh-CN" sz="2000" dirty="0">
-              <a:latin typeface="Consolas" panose="020B0609020204030204" pitchFamily="49" charset="0"/>
-            </a:endParaRPr>
-          </a:p>
-          <a:p>
-            <a:r>
-              <a:rPr lang="zh-CN" altLang="en-US" dirty="0"/>
-              <a:t>剩下的和</a:t>
-            </a:r>
-            <a:r>
-              <a:rPr lang="en-US" altLang="zh-CN" dirty="0" err="1"/>
-              <a:t>OCR_infer</a:t>
-            </a:r>
-            <a:r>
-              <a:rPr lang="en-US" altLang="zh-CN" dirty="0"/>
-              <a:t> </a:t>
-            </a:r>
-            <a:r>
-              <a:rPr lang="zh-CN" altLang="en-US" dirty="0"/>
-              <a:t>的</a:t>
-            </a:r>
-            <a:r>
-              <a:rPr lang="en-GB" dirty="0"/>
-              <a:t>base_model.py</a:t>
-            </a:r>
-            <a:r>
-              <a:rPr lang="zh-CN" altLang="en-US" dirty="0"/>
-              <a:t>一致</a:t>
-            </a:r>
-            <a:endParaRPr lang="en-GB" altLang="zh-CN" dirty="0"/>
-          </a:p>
-          <a:p>
-            <a:endParaRPr lang="en-GB" dirty="0"/>
-          </a:p>
-          <a:p>
-            <a:pPr marL="0" indent="0">
-              <a:buNone/>
-            </a:pPr>
-            <a:endParaRPr lang="en-GB" dirty="0"/>
-          </a:p>
-        </p:txBody>
-      </p:sp>
-      <p:sp>
-        <p:nvSpPr>
-          <p:cNvPr id="5" name="TextBox 4">
-            <a:extLst>
-              <a:ext uri="{FF2B5EF4-FFF2-40B4-BE49-F238E27FC236}">
-                <a16:creationId xmlns:a16="http://schemas.microsoft.com/office/drawing/2014/main" id="{D5649CB6-8B67-26E0-DB6B-F8BC150A1DAB}"/>
-              </a:ext>
-            </a:extLst>
-          </p:cNvPr>
-          <p:cNvSpPr txBox="1"/>
-          <p:nvPr/>
-        </p:nvSpPr>
-        <p:spPr>
-          <a:xfrm>
-            <a:off x="4845377" y="6488668"/>
-            <a:ext cx="3146196" cy="369332"/>
-          </a:xfrm>
-          <a:prstGeom prst="rect">
-            <a:avLst/>
-          </a:prstGeom>
-          <a:noFill/>
-        </p:spPr>
-        <p:txBody>
-          <a:bodyPr wrap="square">
-            <a:spAutoFit/>
+          <a:bodyPr>
+            <a:normAutofit/>
           </a:bodyPr>
           <a:lstStyle/>
           <a:p>
@@ -5537,16 +5415,21 @@
               <a:buNone/>
             </a:pPr>
             <a:r>
-              <a:rPr lang="en-GB" sz="1800" dirty="0"/>
-              <a:t>Appendix</a:t>
-            </a:r>
+              <a:rPr lang="zh-CN" altLang="en-US" sz="4800" dirty="0"/>
+              <a:t>接下來只是一些幫助理解的</a:t>
+            </a:r>
+            <a:r>
+              <a:rPr lang="en-GB" altLang="zh-CN" sz="4800" dirty="0"/>
+              <a:t>notes</a:t>
+            </a:r>
+            <a:endParaRPr lang="en-GB" sz="4800" dirty="0"/>
           </a:p>
         </p:txBody>
       </p:sp>
     </p:spTree>
     <p:extLst>
       <p:ext uri="{BB962C8B-B14F-4D97-AF65-F5344CB8AC3E}">
-        <p14:creationId xmlns:p14="http://schemas.microsoft.com/office/powerpoint/2010/main" val="968647826"/>
+        <p14:creationId xmlns:p14="http://schemas.microsoft.com/office/powerpoint/2010/main" val="4047682127"/>
       </p:ext>
     </p:extLst>
   </p:cSld>
@@ -5578,7 +5461,7 @@
           <p:cNvPr id="2" name="Title 1">
             <a:extLst>
               <a:ext uri="{FF2B5EF4-FFF2-40B4-BE49-F238E27FC236}">
-                <a16:creationId xmlns:a16="http://schemas.microsoft.com/office/drawing/2014/main" id="{8706B172-D1F2-E81F-961C-B2BED6F26838}"/>
+                <a16:creationId xmlns:a16="http://schemas.microsoft.com/office/drawing/2014/main" id="{D62AF5D3-4CFF-9BE6-EBBF-60D0371E041B}"/>
               </a:ext>
             </a:extLst>
           </p:cNvPr>
@@ -5595,8 +5478,32 @@
           <a:lstStyle/>
           <a:p>
             <a:r>
-              <a:rPr lang="it-IT" dirty="0"/>
-              <a:t>Dataloader: model\data\simple_dataset.py </a:t>
+              <a:rPr lang="en-GB" dirty="0"/>
+              <a:t>base_model.py</a:t>
+            </a:r>
+            <a:r>
+              <a:rPr lang="zh-CN" altLang="en-US" dirty="0"/>
+              <a:t>讀</a:t>
+            </a:r>
+            <a:r>
+              <a:rPr lang="en-GB" altLang="zh-CN" dirty="0"/>
+              <a:t>.</a:t>
+            </a:r>
+            <a:r>
+              <a:rPr lang="en-GB" altLang="zh-CN" dirty="0" err="1"/>
+              <a:t>yml</a:t>
+            </a:r>
+            <a:r>
+              <a:rPr lang="en-GB" altLang="zh-CN" dirty="0"/>
+              <a:t> </a:t>
+            </a:r>
+            <a:r>
+              <a:rPr lang="zh-CN" altLang="en-US" dirty="0"/>
+              <a:t>文檔，轉成</a:t>
+            </a:r>
+            <a:r>
+              <a:rPr lang="en-GB" altLang="zh-CN" dirty="0" err="1"/>
+              <a:t>pytorch</a:t>
             </a:r>
             <a:endParaRPr lang="en-GB" dirty="0"/>
           </a:p>
@@ -5607,7 +5514,7 @@
           <p:cNvPr id="3" name="Content Placeholder 2">
             <a:extLst>
               <a:ext uri="{FF2B5EF4-FFF2-40B4-BE49-F238E27FC236}">
-                <a16:creationId xmlns:a16="http://schemas.microsoft.com/office/drawing/2014/main" id="{C87B8EF7-CFF7-CE79-40F7-D4D779973D7B}"/>
+                <a16:creationId xmlns:a16="http://schemas.microsoft.com/office/drawing/2014/main" id="{F575F9DD-B0FF-6DA0-4F8D-DEDEE0D73877}"/>
               </a:ext>
             </a:extLst>
           </p:cNvPr>
@@ -5620,98 +5527,157 @@
         </p:nvSpPr>
         <p:spPr/>
         <p:txBody>
-          <a:bodyPr>
-            <a:normAutofit/>
-          </a:bodyPr>
+          <a:bodyPr/>
           <a:lstStyle/>
           <a:p>
             <a:r>
-              <a:rPr lang="it-IT" dirty="0"/>
-              <a:t>model\data\simple_dataset.py line 56:</a:t>
-            </a:r>
-          </a:p>
-          <a:p>
-            <a:endParaRPr lang="it-IT" dirty="0"/>
-          </a:p>
-          <a:p>
-            <a:r>
-              <a:rPr lang="en-GB" b="0" dirty="0">
-                <a:solidFill>
-                  <a:srgbClr val="569CD6"/>
-                </a:solidFill>
-                <a:effectLst/>
-                <a:latin typeface="Consolas" panose="020B0609020204030204" pitchFamily="49" charset="0"/>
-              </a:rPr>
-              <a:t>class</a:t>
-            </a:r>
-            <a:r>
-              <a:rPr lang="en-GB" b="0" dirty="0">
-                <a:solidFill>
-                  <a:srgbClr val="CCCCCC"/>
-                </a:solidFill>
-                <a:effectLst/>
-                <a:latin typeface="Consolas" panose="020B0609020204030204" pitchFamily="49" charset="0"/>
-              </a:rPr>
-              <a:t> </a:t>
-            </a:r>
-            <a:r>
-              <a:rPr lang="en-GB" b="0" dirty="0" err="1">
-                <a:solidFill>
-                  <a:srgbClr val="4EC9B0"/>
-                </a:solidFill>
-                <a:effectLst/>
-                <a:latin typeface="Consolas" panose="020B0609020204030204" pitchFamily="49" charset="0"/>
-              </a:rPr>
-              <a:t>SimpleDataSet</a:t>
-            </a:r>
-            <a:r>
-              <a:rPr lang="en-GB" b="0" dirty="0">
-                <a:solidFill>
-                  <a:srgbClr val="CCCCCC"/>
-                </a:solidFill>
-                <a:effectLst/>
-                <a:latin typeface="Consolas" panose="020B0609020204030204" pitchFamily="49" charset="0"/>
-              </a:rPr>
-              <a:t>(</a:t>
-            </a:r>
-            <a:r>
-              <a:rPr lang="en-GB" b="0" dirty="0">
-                <a:solidFill>
-                  <a:srgbClr val="4EC9B0"/>
-                </a:solidFill>
-                <a:effectLst/>
-                <a:latin typeface="Consolas" panose="020B0609020204030204" pitchFamily="49" charset="0"/>
-              </a:rPr>
-              <a:t>Dataset</a:t>
-            </a:r>
-            <a:r>
-              <a:rPr lang="en-GB" b="0" dirty="0">
-                <a:solidFill>
-                  <a:srgbClr val="CCCCCC"/>
-                </a:solidFill>
-                <a:effectLst/>
-                <a:latin typeface="Consolas" panose="020B0609020204030204" pitchFamily="49" charset="0"/>
-              </a:rPr>
-              <a:t>)</a:t>
-            </a:r>
-          </a:p>
-          <a:p>
-            <a:endParaRPr lang="en-GB" b="0" dirty="0">
-              <a:solidFill>
-                <a:srgbClr val="CCCCCC"/>
-              </a:solidFill>
+              <a:rPr lang="en-GB" dirty="0"/>
+              <a:t>model\modeling\architectures\base_model.py </a:t>
+            </a:r>
+            <a:r>
+              <a:rPr lang="zh-CN" altLang="en-US" dirty="0"/>
+              <a:t>缺少 </a:t>
+            </a:r>
+            <a:r>
+              <a:rPr lang="en-GB" sz="2000" b="0" dirty="0">
+                <a:effectLst/>
+                <a:latin typeface="Consolas" panose="020B0609020204030204" pitchFamily="49" charset="0"/>
+              </a:rPr>
+              <a:t>self._</a:t>
+            </a:r>
+            <a:r>
+              <a:rPr lang="en-GB" sz="2000" b="0" dirty="0" err="1">
+                <a:effectLst/>
+                <a:latin typeface="Consolas" panose="020B0609020204030204" pitchFamily="49" charset="0"/>
+              </a:rPr>
+              <a:t>initialize_weights</a:t>
+            </a:r>
+            <a:r>
+              <a:rPr lang="en-GB" sz="2000" b="0" dirty="0">
+                <a:effectLst/>
+                <a:latin typeface="Consolas" panose="020B0609020204030204" pitchFamily="49" charset="0"/>
+              </a:rPr>
+              <a:t>()</a:t>
+            </a:r>
+            <a:r>
+              <a:rPr lang="zh-CN" altLang="en-US" sz="2000" b="0" dirty="0">
+                <a:effectLst/>
+                <a:latin typeface="Consolas" panose="020B0609020204030204" pitchFamily="49" charset="0"/>
+              </a:rPr>
+              <a:t>， </a:t>
+            </a:r>
+            <a:endParaRPr lang="en-GB" altLang="zh-CN" sz="2000" b="0" dirty="0">
               <a:effectLst/>
               <a:latin typeface="Consolas" panose="020B0609020204030204" pitchFamily="49" charset="0"/>
             </a:endParaRPr>
           </a:p>
-        </p:txBody>
-      </p:sp>
-      <p:sp>
-        <p:nvSpPr>
-          <p:cNvPr id="4" name="TextBox 3">
-            <a:extLst>
-              <a:ext uri="{FF2B5EF4-FFF2-40B4-BE49-F238E27FC236}">
-                <a16:creationId xmlns:a16="http://schemas.microsoft.com/office/drawing/2014/main" id="{3A345E18-69D3-1B1F-AE56-C4ACDC08428C}"/>
+          <a:p>
+            <a:pPr marL="0" indent="0">
+              <a:buNone/>
+            </a:pPr>
+            <a:r>
+              <a:rPr lang="zh-CN" altLang="en-US" sz="2000" dirty="0">
+                <a:latin typeface="Consolas" panose="020B0609020204030204" pitchFamily="49" charset="0"/>
+              </a:rPr>
+              <a:t>以及</a:t>
+            </a:r>
+            <a:r>
+              <a:rPr lang="en-GB" sz="2000" b="0" dirty="0">
+                <a:effectLst/>
+                <a:latin typeface="Consolas" panose="020B0609020204030204" pitchFamily="49" charset="0"/>
+              </a:rPr>
+              <a:t>if </a:t>
+            </a:r>
+            <a:r>
+              <a:rPr lang="en-GB" sz="2000" b="0" dirty="0" err="1">
+                <a:effectLst/>
+                <a:latin typeface="Consolas" panose="020B0609020204030204" pitchFamily="49" charset="0"/>
+              </a:rPr>
+              <a:t>self.use_transform</a:t>
+            </a:r>
+            <a:r>
+              <a:rPr lang="en-GB" sz="2000" b="0" dirty="0">
+                <a:effectLst/>
+                <a:latin typeface="Consolas" panose="020B0609020204030204" pitchFamily="49" charset="0"/>
+              </a:rPr>
+              <a:t>:</a:t>
+            </a:r>
+          </a:p>
+          <a:p>
+            <a:pPr marL="0" indent="0">
+              <a:buNone/>
+            </a:pPr>
+            <a:r>
+              <a:rPr lang="en-GB" sz="2000" b="0" dirty="0">
+                <a:effectLst/>
+                <a:latin typeface="Consolas" panose="020B0609020204030204" pitchFamily="49" charset="0"/>
+              </a:rPr>
+              <a:t>        x = </a:t>
+            </a:r>
+            <a:r>
+              <a:rPr lang="en-GB" sz="2000" b="0" dirty="0" err="1">
+                <a:effectLst/>
+                <a:latin typeface="Consolas" panose="020B0609020204030204" pitchFamily="49" charset="0"/>
+              </a:rPr>
+              <a:t>self.transform</a:t>
+            </a:r>
+            <a:r>
+              <a:rPr lang="en-GB" sz="2000" b="0" dirty="0">
+                <a:effectLst/>
+                <a:latin typeface="Consolas" panose="020B0609020204030204" pitchFamily="49" charset="0"/>
+              </a:rPr>
+              <a:t>(x)</a:t>
+            </a:r>
+          </a:p>
+          <a:p>
+            <a:endParaRPr lang="en-GB" altLang="zh-CN" sz="2000" dirty="0">
+              <a:latin typeface="Consolas" panose="020B0609020204030204" pitchFamily="49" charset="0"/>
+            </a:endParaRPr>
+          </a:p>
+          <a:p>
+            <a:r>
+              <a:rPr lang="zh-CN" altLang="en-US" dirty="0"/>
+              <a:t>剩下的和</a:t>
+            </a:r>
+            <a:r>
+              <a:rPr lang="en-US" altLang="zh-CN" dirty="0" err="1"/>
+              <a:t>OCR_infer</a:t>
+            </a:r>
+            <a:r>
+              <a:rPr lang="en-US" altLang="zh-CN" dirty="0"/>
+              <a:t> </a:t>
+            </a:r>
+            <a:r>
+              <a:rPr lang="zh-CN" altLang="en-US" dirty="0"/>
+              <a:t>的</a:t>
+            </a:r>
+            <a:r>
+              <a:rPr lang="en-GB" dirty="0"/>
+              <a:t>base_model.py</a:t>
+            </a:r>
+            <a:r>
+              <a:rPr lang="zh-CN" altLang="en-US" dirty="0"/>
+              <a:t>一致</a:t>
+            </a:r>
+            <a:endParaRPr lang="en-GB" altLang="zh-CN" dirty="0"/>
+          </a:p>
+          <a:p>
+            <a:endParaRPr lang="en-GB" dirty="0"/>
+          </a:p>
+          <a:p>
+            <a:pPr marL="0" indent="0">
+              <a:buNone/>
+            </a:pPr>
+            <a:endParaRPr lang="en-GB" dirty="0"/>
+          </a:p>
+        </p:txBody>
+      </p:sp>
+      <p:sp>
+        <p:nvSpPr>
+          <p:cNvPr id="5" name="TextBox 4">
+            <a:extLst>
+              <a:ext uri="{FF2B5EF4-FFF2-40B4-BE49-F238E27FC236}">
+                <a16:creationId xmlns:a16="http://schemas.microsoft.com/office/drawing/2014/main" id="{D5649CB6-8B67-26E0-DB6B-F8BC150A1DAB}"/>
               </a:ext>
             </a:extLst>
           </p:cNvPr>
@@ -5747,7 +5713,7 @@
     </p:spTree>
     <p:extLst>
       <p:ext uri="{BB962C8B-B14F-4D97-AF65-F5344CB8AC3E}">
-        <p14:creationId xmlns:p14="http://schemas.microsoft.com/office/powerpoint/2010/main" val="809864632"/>
+        <p14:creationId xmlns:p14="http://schemas.microsoft.com/office/powerpoint/2010/main" val="968647826"/>
       </p:ext>
     </p:extLst>
   </p:cSld>
@@ -5779,7 +5745,7 @@
           <p:cNvPr id="2" name="Title 1">
             <a:extLst>
               <a:ext uri="{FF2B5EF4-FFF2-40B4-BE49-F238E27FC236}">
-                <a16:creationId xmlns:a16="http://schemas.microsoft.com/office/drawing/2014/main" id="{EFB87CE2-FA5B-B2F3-7F32-6B7D316B86D1}"/>
+                <a16:creationId xmlns:a16="http://schemas.microsoft.com/office/drawing/2014/main" id="{8706B172-D1F2-E81F-961C-B2BED6F26838}"/>
               </a:ext>
             </a:extLst>
           </p:cNvPr>
@@ -5796,24 +5762,8 @@
           <a:lstStyle/>
           <a:p>
             <a:r>
-              <a:rPr lang="zh-CN" altLang="en-US" dirty="0"/>
-              <a:t>使用</a:t>
-            </a:r>
-            <a:r>
-              <a:rPr lang="en-US" altLang="zh-CN" dirty="0"/>
-              <a:t>CPU</a:t>
-            </a:r>
-            <a:r>
-              <a:rPr lang="zh-CN" altLang="en-US" dirty="0"/>
-              <a:t>所以我把</a:t>
-            </a:r>
-            <a:r>
-              <a:rPr lang="en-GB" altLang="zh-CN" dirty="0" err="1"/>
-              <a:t>cuda</a:t>
-            </a:r>
-            <a:r>
-              <a:rPr lang="zh-CN" altLang="en-US" dirty="0"/>
-              <a:t>這行改了</a:t>
+              <a:rPr lang="it-IT" dirty="0"/>
+              <a:t>Dataloader: model\data\simple_dataset.py </a:t>
             </a:r>
             <a:endParaRPr lang="en-GB" dirty="0"/>
           </a:p>
@@ -5824,7 +5774,7 @@
           <p:cNvPr id="3" name="Content Placeholder 2">
             <a:extLst>
               <a:ext uri="{FF2B5EF4-FFF2-40B4-BE49-F238E27FC236}">
-                <a16:creationId xmlns:a16="http://schemas.microsoft.com/office/drawing/2014/main" id="{A3B0312F-1931-6E9B-AC14-4A8345F9949C}"/>
+                <a16:creationId xmlns:a16="http://schemas.microsoft.com/office/drawing/2014/main" id="{C87B8EF7-CFF7-CE79-40F7-D4D779973D7B}"/>
               </a:ext>
             </a:extLst>
           </p:cNvPr>
@@ -5837,106 +5787,83 @@
         </p:nvSpPr>
         <p:spPr/>
         <p:txBody>
-          <a:bodyPr/>
+          <a:bodyPr>
+            <a:normAutofit/>
+          </a:bodyPr>
           <a:lstStyle/>
           <a:p>
             <a:r>
-              <a:rPr lang="en-GB" dirty="0"/>
-              <a:t>Program.py line 98 </a:t>
-            </a:r>
-          </a:p>
-          <a:p>
-            <a:r>
-              <a:rPr lang="en-GB" sz="2000" b="0" dirty="0">
-                <a:solidFill>
-                  <a:srgbClr val="6A9955"/>
-                </a:solidFill>
-                <a:effectLst/>
-                <a:latin typeface="Consolas" panose="020B0609020204030204" pitchFamily="49" charset="0"/>
-              </a:rPr>
-              <a:t># device = '</a:t>
-            </a:r>
-            <a:r>
-              <a:rPr lang="en-GB" sz="2000" b="0" dirty="0" err="1">
-                <a:solidFill>
-                  <a:srgbClr val="6A9955"/>
-                </a:solidFill>
-                <a:effectLst/>
-                <a:latin typeface="Consolas" panose="020B0609020204030204" pitchFamily="49" charset="0"/>
-              </a:rPr>
-              <a:t>cuda</a:t>
-            </a:r>
-            <a:r>
-              <a:rPr lang="en-GB" sz="2000" b="0" dirty="0">
-                <a:solidFill>
-                  <a:srgbClr val="6A9955"/>
-                </a:solidFill>
-                <a:effectLst/>
-                <a:latin typeface="Consolas" panose="020B0609020204030204" pitchFamily="49" charset="0"/>
-              </a:rPr>
-              <a:t>:{}'.format(config['Global']['</a:t>
-            </a:r>
-            <a:r>
-              <a:rPr lang="en-GB" sz="2000" b="0" dirty="0" err="1">
-                <a:solidFill>
-                  <a:srgbClr val="6A9955"/>
-                </a:solidFill>
-                <a:effectLst/>
-                <a:latin typeface="Consolas" panose="020B0609020204030204" pitchFamily="49" charset="0"/>
-              </a:rPr>
-              <a:t>gpu_id</a:t>
-            </a:r>
-            <a:r>
-              <a:rPr lang="en-GB" sz="2000" b="0" dirty="0">
-                <a:solidFill>
-                  <a:srgbClr val="6A9955"/>
-                </a:solidFill>
-                <a:effectLst/>
-                <a:latin typeface="Consolas" panose="020B0609020204030204" pitchFamily="49" charset="0"/>
-              </a:rPr>
-              <a:t>']) if </a:t>
-            </a:r>
-            <a:r>
-              <a:rPr lang="en-GB" sz="2000" b="0" dirty="0" err="1">
-                <a:solidFill>
-                  <a:srgbClr val="6A9955"/>
-                </a:solidFill>
-                <a:effectLst/>
-                <a:latin typeface="Consolas" panose="020B0609020204030204" pitchFamily="49" charset="0"/>
-              </a:rPr>
-              <a:t>use_gpu</a:t>
-            </a:r>
-            <a:r>
-              <a:rPr lang="en-GB" sz="2000" b="0" dirty="0">
-                <a:solidFill>
-                  <a:srgbClr val="6A9955"/>
-                </a:solidFill>
-                <a:effectLst/>
-                <a:latin typeface="Consolas" panose="020B0609020204030204" pitchFamily="49" charset="0"/>
-              </a:rPr>
-              <a:t> else '</a:t>
-            </a:r>
-            <a:r>
-              <a:rPr lang="en-GB" sz="2000" b="0" dirty="0" err="1">
-                <a:solidFill>
-                  <a:srgbClr val="6A9955"/>
-                </a:solidFill>
-                <a:effectLst/>
-                <a:latin typeface="Consolas" panose="020B0609020204030204" pitchFamily="49" charset="0"/>
-              </a:rPr>
-              <a:t>cpu</a:t>
-            </a:r>
-            <a:r>
-              <a:rPr lang="en-GB" sz="2000" b="0" dirty="0">
-                <a:solidFill>
-                  <a:srgbClr val="6A9955"/>
-                </a:solidFill>
-                <a:effectLst/>
-                <a:latin typeface="Consolas" panose="020B0609020204030204" pitchFamily="49" charset="0"/>
-              </a:rPr>
-              <a:t>'</a:t>
-            </a:r>
-            <a:endParaRPr lang="en-GB" sz="2000" b="0" dirty="0">
+              <a:rPr lang="it-IT" dirty="0"/>
+              <a:t>model\data\simple_dataset.py line 56:</a:t>
+            </a:r>
+          </a:p>
+          <a:p>
+            <a:endParaRPr lang="it-IT" dirty="0"/>
+          </a:p>
+          <a:p>
+            <a:r>
+              <a:rPr lang="en-GB" b="0" dirty="0">
+                <a:solidFill>
+                  <a:srgbClr val="569CD6"/>
+                </a:solidFill>
+                <a:effectLst/>
+                <a:latin typeface="Consolas" panose="020B0609020204030204" pitchFamily="49" charset="0"/>
+              </a:rPr>
+              <a:t>class</a:t>
+            </a:r>
+            <a:r>
+              <a:rPr lang="en-GB" b="0" dirty="0">
+                <a:solidFill>
+                  <a:srgbClr val="CCCCCC"/>
+                </a:solidFill>
+                <a:effectLst/>
+                <a:latin typeface="Consolas" panose="020B0609020204030204" pitchFamily="49" charset="0"/>
+              </a:rPr>
+              <a:t> </a:t>
+            </a:r>
+            <a:r>
+              <a:rPr lang="en-GB" b="0" dirty="0" err="1">
+                <a:solidFill>
+                  <a:srgbClr val="4EC9B0"/>
+                </a:solidFill>
+                <a:effectLst/>
+                <a:latin typeface="Consolas" panose="020B0609020204030204" pitchFamily="49" charset="0"/>
+              </a:rPr>
+              <a:t>SimpleDataSet</a:t>
+            </a:r>
+            <a:r>
+              <a:rPr lang="en-GB" b="0" dirty="0">
+                <a:solidFill>
+                  <a:srgbClr val="CCCCCC"/>
+                </a:solidFill>
+                <a:effectLst/>
+                <a:latin typeface="Consolas" panose="020B0609020204030204" pitchFamily="49" charset="0"/>
+              </a:rPr>
+              <a:t>(</a:t>
+            </a:r>
+            <a:r>
+              <a:rPr lang="en-GB" b="0" dirty="0">
+                <a:solidFill>
+                  <a:srgbClr val="4EC9B0"/>
+                </a:solidFill>
+                <a:effectLst/>
+                <a:latin typeface="Consolas" panose="020B0609020204030204" pitchFamily="49" charset="0"/>
+              </a:rPr>
+              <a:t>Dataset</a:t>
+            </a:r>
+            <a:r>
+              <a:rPr lang="en-GB" b="0" dirty="0">
+                <a:solidFill>
+                  <a:srgbClr val="CCCCCC"/>
+                </a:solidFill>
+                <a:effectLst/>
+                <a:latin typeface="Consolas" panose="020B0609020204030204" pitchFamily="49" charset="0"/>
+              </a:rPr>
+              <a:t>)</a:t>
+            </a:r>
+          </a:p>
+          <a:p>
+            <a:endParaRPr lang="en-GB" b="0" dirty="0">
               <a:solidFill>
                 <a:srgbClr val="CCCCCC"/>
               </a:solidFill>
@@ -5944,15 +5871,50 @@
               <a:latin typeface="Consolas" panose="020B0609020204030204" pitchFamily="49" charset="0"/>
             </a:endParaRPr>
           </a:p>
-          <a:p>
-            <a:endParaRPr lang="en-GB" dirty="0"/>
+        </p:txBody>
+      </p:sp>
+      <p:sp>
+        <p:nvSpPr>
+          <p:cNvPr id="4" name="TextBox 3">
+            <a:extLst>
+              <a:ext uri="{FF2B5EF4-FFF2-40B4-BE49-F238E27FC236}">
+                <a16:creationId xmlns:a16="http://schemas.microsoft.com/office/drawing/2014/main" id="{3A345E18-69D3-1B1F-AE56-C4ACDC08428C}"/>
+              </a:ext>
+            </a:extLst>
+          </p:cNvPr>
+          <p:cNvSpPr txBox="1"/>
+          <p:nvPr/>
+        </p:nvSpPr>
+        <p:spPr>
+          <a:xfrm>
+            <a:off x="4845377" y="6488668"/>
+            <a:ext cx="3146196" cy="369332"/>
+          </a:xfrm>
+          <a:prstGeom prst="rect">
+            <a:avLst/>
+          </a:prstGeom>
+          <a:noFill/>
+        </p:spPr>
+        <p:txBody>
+          <a:bodyPr wrap="square">
+            <a:spAutoFit/>
+          </a:bodyPr>
+          <a:lstStyle/>
+          <a:p>
+            <a:pPr marL="0" indent="0" algn="ctr">
+              <a:buNone/>
+            </a:pPr>
+            <a:r>
+              <a:rPr lang="en-GB" sz="1800" dirty="0"/>
+              <a:t>Appendix</a:t>
+            </a:r>
           </a:p>
         </p:txBody>
       </p:sp>
     </p:spTree>
     <p:extLst>
       <p:ext uri="{BB962C8B-B14F-4D97-AF65-F5344CB8AC3E}">
-        <p14:creationId xmlns:p14="http://schemas.microsoft.com/office/powerpoint/2010/main" val="2806469842"/>
+        <p14:creationId xmlns:p14="http://schemas.microsoft.com/office/powerpoint/2010/main" val="809864632"/>
       </p:ext>
     </p:extLst>
   </p:cSld>
@@ -5984,7 +5946,7 @@
           <p:cNvPr id="2" name="Title 1">
             <a:extLst>
               <a:ext uri="{FF2B5EF4-FFF2-40B4-BE49-F238E27FC236}">
-                <a16:creationId xmlns:a16="http://schemas.microsoft.com/office/drawing/2014/main" id="{E670ECF5-BF7E-982E-A0B9-0C138C4DDA53}"/>
+                <a16:creationId xmlns:a16="http://schemas.microsoft.com/office/drawing/2014/main" id="{EFB87CE2-FA5B-B2F3-7F32-6B7D316B86D1}"/>
               </a:ext>
             </a:extLst>
           </p:cNvPr>
@@ -6001,444 +5963,155 @@
           <a:lstStyle/>
           <a:p>
             <a:r>
+              <a:rPr lang="zh-CN" altLang="en-US" dirty="0"/>
+              <a:t>使用</a:t>
+            </a:r>
+            <a:r>
+              <a:rPr lang="en-US" altLang="zh-CN" dirty="0"/>
+              <a:t>CPU</a:t>
+            </a:r>
+            <a:r>
+              <a:rPr lang="zh-CN" altLang="en-US" dirty="0"/>
+              <a:t>所以我把</a:t>
+            </a:r>
+            <a:r>
+              <a:rPr lang="en-GB" altLang="zh-CN" dirty="0" err="1"/>
+              <a:t>cuda</a:t>
+            </a:r>
+            <a:r>
+              <a:rPr lang="zh-CN" altLang="en-US" dirty="0"/>
+              <a:t>這行改了</a:t>
+            </a:r>
+            <a:endParaRPr lang="en-GB" dirty="0"/>
+          </a:p>
+        </p:txBody>
+      </p:sp>
+      <p:sp>
+        <p:nvSpPr>
+          <p:cNvPr id="3" name="Content Placeholder 2">
+            <a:extLst>
+              <a:ext uri="{FF2B5EF4-FFF2-40B4-BE49-F238E27FC236}">
+                <a16:creationId xmlns:a16="http://schemas.microsoft.com/office/drawing/2014/main" id="{A3B0312F-1931-6E9B-AC14-4A8345F9949C}"/>
+              </a:ext>
+            </a:extLst>
+          </p:cNvPr>
+          <p:cNvSpPr>
+            <a:spLocks noGrp="1"/>
+          </p:cNvSpPr>
+          <p:nvPr>
+            <p:ph idx="1"/>
+          </p:nvPr>
+        </p:nvSpPr>
+        <p:spPr/>
+        <p:txBody>
+          <a:bodyPr/>
+          <a:lstStyle/>
+          <a:p>
+            <a:r>
               <a:rPr lang="en-GB" dirty="0"/>
-              <a:t>Error when parsing</a:t>
-            </a:r>
-          </a:p>
-        </p:txBody>
-      </p:sp>
-      <p:sp>
-        <p:nvSpPr>
-          <p:cNvPr id="3" name="Content Placeholder 2">
-            <a:extLst>
-              <a:ext uri="{FF2B5EF4-FFF2-40B4-BE49-F238E27FC236}">
-                <a16:creationId xmlns:a16="http://schemas.microsoft.com/office/drawing/2014/main" id="{EDF3AB5E-2C63-BA19-0C9C-B9205C55DB31}"/>
-              </a:ext>
-            </a:extLst>
-          </p:cNvPr>
-          <p:cNvSpPr>
-            <a:spLocks noGrp="1"/>
-          </p:cNvSpPr>
-          <p:nvPr>
-            <p:ph idx="1"/>
-          </p:nvPr>
-        </p:nvSpPr>
-        <p:spPr>
-          <a:xfrm>
-            <a:off x="403860" y="1825625"/>
-            <a:ext cx="11597640" cy="4072255"/>
-          </a:xfrm>
-        </p:spPr>
-        <p:txBody>
-          <a:bodyPr>
-            <a:noAutofit/>
-          </a:bodyPr>
-          <a:lstStyle/>
-          <a:p>
-            <a:pPr marL="0" indent="0">
-              <a:buNone/>
-            </a:pPr>
-            <a:r>
-              <a:rPr lang="en-GB" sz="1500" b="1" dirty="0"/>
-              <a:t> error happened with </a:t>
-            </a:r>
-            <a:r>
-              <a:rPr lang="en-GB" sz="1500" b="1" dirty="0" err="1"/>
-              <a:t>msg:Traceback</a:t>
-            </a:r>
-            <a:r>
-              <a:rPr lang="en-GB" sz="1500" b="1" dirty="0"/>
-              <a:t> (most recent call last):</a:t>
-            </a:r>
-          </a:p>
-          <a:p>
-            <a:pPr marL="0" indent="0">
-              <a:buNone/>
-            </a:pPr>
-            <a:r>
-              <a:rPr lang="en-GB" sz="1500" b="1" dirty="0"/>
-              <a:t>  File "C:\Users\PingChen\OneDrive - The University of Liverpool\Desktop\KYC </a:t>
-            </a:r>
-            <a:r>
-              <a:rPr lang="zh-TW" altLang="en-US" sz="1500" b="1" dirty="0"/>
-              <a:t>副業</a:t>
-            </a:r>
-            <a:r>
-              <a:rPr lang="en-US" altLang="zh-TW" sz="1500" b="1" dirty="0"/>
-              <a:t>\</a:t>
-            </a:r>
-            <a:r>
-              <a:rPr lang="en-GB" sz="1500" b="1" dirty="0"/>
-              <a:t>OCR\</a:t>
-            </a:r>
-            <a:r>
-              <a:rPr lang="en-GB" sz="1500" b="1" dirty="0" err="1"/>
-              <a:t>ocr_training_det</a:t>
-            </a:r>
-            <a:r>
-              <a:rPr lang="en-GB" sz="1500" b="1" dirty="0"/>
-              <a:t>\model\data\simple_dataset.py", line 131, in __</a:t>
-            </a:r>
-            <a:r>
-              <a:rPr lang="en-GB" sz="1500" b="1" dirty="0" err="1"/>
-              <a:t>getitem</a:t>
-            </a:r>
-            <a:r>
-              <a:rPr lang="en-GB" sz="1500" b="1" dirty="0"/>
-              <a:t>__</a:t>
-            </a:r>
-          </a:p>
-          <a:p>
-            <a:pPr marL="0" indent="0">
-              <a:buNone/>
-            </a:pPr>
-            <a:r>
-              <a:rPr lang="en-GB" sz="1500" b="1" dirty="0"/>
-              <a:t>    outs = transform(data, </a:t>
-            </a:r>
-            <a:r>
-              <a:rPr lang="en-GB" sz="1500" b="1" dirty="0" err="1"/>
-              <a:t>self.ops</a:t>
-            </a:r>
-            <a:r>
-              <a:rPr lang="en-GB" sz="1500" b="1" dirty="0"/>
-              <a:t>)</a:t>
-            </a:r>
-          </a:p>
-          <a:p>
-            <a:pPr marL="0" indent="0">
-              <a:buNone/>
-            </a:pPr>
-            <a:r>
-              <a:rPr lang="en-GB" sz="1500" b="1" dirty="0"/>
-              <a:t>  File "C:\Users\PingChen\OneDrive - The University of Liverpool\Desktop\KYC </a:t>
-            </a:r>
-            <a:r>
-              <a:rPr lang="zh-TW" altLang="en-US" sz="1500" b="1" dirty="0"/>
-              <a:t>副業</a:t>
-            </a:r>
-            <a:r>
-              <a:rPr lang="en-US" altLang="zh-TW" sz="1500" b="1" dirty="0"/>
-              <a:t>\</a:t>
-            </a:r>
-            <a:r>
-              <a:rPr lang="en-GB" sz="1500" b="1" dirty="0"/>
-              <a:t>OCR\</a:t>
-            </a:r>
-            <a:r>
-              <a:rPr lang="en-GB" sz="1500" b="1" dirty="0" err="1"/>
-              <a:t>ocr_training_det</a:t>
-            </a:r>
-            <a:r>
-              <a:rPr lang="en-GB" sz="1500" b="1" dirty="0"/>
-              <a:t>\model\data\</a:t>
-            </a:r>
-            <a:r>
-              <a:rPr lang="en-GB" sz="1500" b="1" dirty="0" err="1"/>
-              <a:t>imaug</a:t>
-            </a:r>
-            <a:r>
-              <a:rPr lang="en-GB" sz="1500" b="1" dirty="0"/>
-              <a:t>\__init__.py", line 13, in transform</a:t>
-            </a:r>
-          </a:p>
-          <a:p>
-            <a:pPr marL="0" indent="0">
-              <a:buNone/>
-            </a:pPr>
-            <a:r>
-              <a:rPr lang="en-GB" sz="1500" b="1" dirty="0"/>
-              <a:t>    data = op(data)</a:t>
-            </a:r>
-          </a:p>
-          <a:p>
-            <a:pPr marL="0" indent="0">
-              <a:buNone/>
-            </a:pPr>
-            <a:r>
-              <a:rPr lang="en-GB" sz="1500" b="1" dirty="0"/>
-              <a:t>  File "C:\Users\PingChen\OneDrive - The University of Liverpool\Desktop\KYC </a:t>
-            </a:r>
-            <a:r>
-              <a:rPr lang="zh-TW" altLang="en-US" sz="1500" b="1" dirty="0"/>
-              <a:t>副業</a:t>
-            </a:r>
-            <a:r>
-              <a:rPr lang="en-US" altLang="zh-TW" sz="1500" b="1" dirty="0"/>
-              <a:t>\</a:t>
-            </a:r>
-            <a:r>
-              <a:rPr lang="en-GB" sz="1500" b="1" dirty="0"/>
-              <a:t>OCR\</a:t>
-            </a:r>
-            <a:r>
-              <a:rPr lang="en-GB" sz="1500" b="1" dirty="0" err="1"/>
-              <a:t>ocr_training_det</a:t>
-            </a:r>
-            <a:r>
-              <a:rPr lang="en-GB" sz="1500" b="1" dirty="0"/>
-              <a:t>\model\data\</a:t>
-            </a:r>
-            <a:r>
-              <a:rPr lang="en-GB" sz="1500" b="1" dirty="0" err="1"/>
-              <a:t>imaug</a:t>
-            </a:r>
-            <a:r>
-              <a:rPr lang="en-GB" sz="1500" b="1" dirty="0"/>
-              <a:t>\label_ops.py", line 28, in __call__</a:t>
-            </a:r>
-          </a:p>
-          <a:p>
-            <a:pPr marL="0" indent="0">
-              <a:buNone/>
-            </a:pPr>
-            <a:r>
-              <a:rPr lang="en-GB" sz="1500" b="1" dirty="0"/>
-              <a:t>    </a:t>
-            </a:r>
-            <a:r>
-              <a:rPr lang="en-GB" sz="1500" b="1" dirty="0" err="1"/>
-              <a:t>txt_tags</a:t>
-            </a:r>
-            <a:r>
-              <a:rPr lang="en-GB" sz="1500" b="1" dirty="0"/>
-              <a:t> = </a:t>
-            </a:r>
-            <a:r>
-              <a:rPr lang="en-GB" sz="1500" b="1" dirty="0" err="1"/>
-              <a:t>np.array</a:t>
-            </a:r>
-            <a:r>
-              <a:rPr lang="en-GB" sz="1500" b="1" dirty="0"/>
-              <a:t>(</a:t>
-            </a:r>
-            <a:r>
-              <a:rPr lang="en-GB" sz="1500" b="1" dirty="0" err="1"/>
-              <a:t>txt_tags,dtype</a:t>
-            </a:r>
-            <a:r>
-              <a:rPr lang="en-GB" sz="1500" b="1" dirty="0"/>
-              <a:t>=</a:t>
-            </a:r>
-            <a:r>
-              <a:rPr lang="en-GB" sz="1500" b="1" dirty="0" err="1"/>
-              <a:t>np.bool</a:t>
-            </a:r>
-            <a:r>
-              <a:rPr lang="en-GB" sz="1500" b="1" dirty="0"/>
-              <a:t>)</a:t>
-            </a:r>
-          </a:p>
-          <a:p>
-            <a:pPr marL="0" indent="0">
-              <a:buNone/>
-            </a:pPr>
-            <a:r>
-              <a:rPr lang="en-GB" sz="1500" b="1" dirty="0"/>
-              <a:t>  File "C:\Users\PingChen\AppData\Local\anaconda3\envs\OCR_test\lib\site-packages\numpy\__init__.py", line 305, in __</a:t>
-            </a:r>
-            <a:r>
-              <a:rPr lang="en-GB" sz="1500" b="1" dirty="0" err="1"/>
-              <a:t>getattr</a:t>
-            </a:r>
-            <a:r>
-              <a:rPr lang="en-GB" sz="1500" b="1" dirty="0"/>
-              <a:t>__</a:t>
-            </a:r>
-          </a:p>
-          <a:p>
-            <a:pPr marL="0" indent="0">
-              <a:buNone/>
-            </a:pPr>
-            <a:r>
-              <a:rPr lang="en-GB" sz="1500" b="1" dirty="0"/>
-              <a:t>    raise </a:t>
-            </a:r>
-            <a:r>
-              <a:rPr lang="en-GB" sz="1500" b="1" dirty="0" err="1"/>
-              <a:t>AttributeError</a:t>
-            </a:r>
-            <a:r>
-              <a:rPr lang="en-GB" sz="1500" b="1" dirty="0"/>
-              <a:t>(__</a:t>
-            </a:r>
-            <a:r>
-              <a:rPr lang="en-GB" sz="1500" b="1" dirty="0" err="1"/>
-              <a:t>former_attrs</a:t>
-            </a:r>
-            <a:r>
-              <a:rPr lang="en-GB" sz="1500" b="1" dirty="0"/>
-              <a:t>__[</a:t>
-            </a:r>
-            <a:r>
-              <a:rPr lang="en-GB" sz="1500" b="1" dirty="0" err="1"/>
-              <a:t>attr</a:t>
-            </a:r>
-            <a:r>
-              <a:rPr lang="en-GB" sz="1500" b="1" dirty="0"/>
-              <a:t>])</a:t>
-            </a:r>
-          </a:p>
-          <a:p>
-            <a:pPr marL="0" indent="0">
-              <a:buNone/>
-            </a:pPr>
-            <a:r>
-              <a:rPr lang="en-GB" sz="1500" b="1" dirty="0" err="1"/>
-              <a:t>AttributeError</a:t>
-            </a:r>
-            <a:r>
-              <a:rPr lang="en-GB" sz="1500" b="1" dirty="0"/>
-              <a:t>: module '</a:t>
-            </a:r>
-            <a:r>
-              <a:rPr lang="en-GB" sz="1500" b="1" dirty="0" err="1"/>
-              <a:t>numpy</a:t>
-            </a:r>
-            <a:r>
-              <a:rPr lang="en-GB" sz="1500" b="1" dirty="0"/>
-              <a:t>' has no attribute 'bool'.</a:t>
-            </a:r>
-          </a:p>
-          <a:p>
-            <a:pPr marL="0" indent="0">
-              <a:buNone/>
-            </a:pPr>
-            <a:r>
-              <a:rPr lang="en-GB" sz="1500" b="1" dirty="0"/>
-              <a:t>https://numpy.org/devdocs/release/1.20.0-notes.html#deprecations</a:t>
-            </a:r>
-          </a:p>
-        </p:txBody>
-      </p:sp>
-      <p:sp>
-        <p:nvSpPr>
-          <p:cNvPr id="4" name="TextBox 3">
-            <a:extLst>
-              <a:ext uri="{FF2B5EF4-FFF2-40B4-BE49-F238E27FC236}">
-                <a16:creationId xmlns:a16="http://schemas.microsoft.com/office/drawing/2014/main" id="{7CE2F764-0241-072F-CBFC-06F8C3161EA4}"/>
-              </a:ext>
-            </a:extLst>
-          </p:cNvPr>
-          <p:cNvSpPr txBox="1"/>
-          <p:nvPr/>
-        </p:nvSpPr>
-        <p:spPr>
-          <a:xfrm>
-            <a:off x="1836420" y="6256020"/>
-            <a:ext cx="9281160" cy="646331"/>
-          </a:xfrm>
-          <a:prstGeom prst="rect">
-            <a:avLst/>
-          </a:prstGeom>
-          <a:noFill/>
-        </p:spPr>
-        <p:txBody>
-          <a:bodyPr wrap="square" rtlCol="0">
-            <a:spAutoFit/>
-          </a:bodyPr>
-          <a:lstStyle/>
-          <a:p>
-            <a:r>
-              <a:rPr lang="en-US" altLang="zh-CN" b="0" i="0" dirty="0" err="1">
-                <a:solidFill>
-                  <a:srgbClr val="1F2328"/>
-                </a:solidFill>
-                <a:effectLst/>
-                <a:latin typeface="-apple-system"/>
-              </a:rPr>
-              <a:t>numpy</a:t>
-            </a:r>
-            <a:r>
-              <a:rPr lang="zh-CN" altLang="en-US" b="0" i="0" dirty="0">
-                <a:solidFill>
-                  <a:srgbClr val="1F2328"/>
-                </a:solidFill>
-                <a:effectLst/>
-                <a:latin typeface="-apple-system"/>
-              </a:rPr>
-              <a:t>版本尝试了</a:t>
-            </a:r>
-            <a:r>
-              <a:rPr lang="en-US" altLang="zh-CN" b="0" i="0" dirty="0">
-                <a:solidFill>
-                  <a:srgbClr val="1F2328"/>
-                </a:solidFill>
-                <a:effectLst/>
-                <a:latin typeface="-apple-system"/>
-              </a:rPr>
-              <a:t>1.24.4</a:t>
-            </a:r>
-            <a:r>
-              <a:rPr lang="zh-CN" altLang="en-US" b="0" i="0" dirty="0">
-                <a:solidFill>
-                  <a:srgbClr val="1F2328"/>
-                </a:solidFill>
-                <a:effectLst/>
-                <a:latin typeface="-apple-system"/>
-              </a:rPr>
-              <a:t>和</a:t>
-            </a:r>
-            <a:r>
-              <a:rPr lang="en-US" altLang="zh-CN" b="0" i="0" dirty="0">
-                <a:solidFill>
-                  <a:srgbClr val="1F2328"/>
-                </a:solidFill>
-                <a:effectLst/>
-                <a:latin typeface="-apple-system"/>
-              </a:rPr>
-              <a:t>1.24.3</a:t>
-            </a:r>
-            <a:r>
-              <a:rPr lang="zh-CN" altLang="en-US" b="0" i="0" dirty="0">
-                <a:solidFill>
-                  <a:srgbClr val="1F2328"/>
-                </a:solidFill>
-                <a:effectLst/>
-                <a:latin typeface="-apple-system"/>
-              </a:rPr>
-              <a:t>，都会报这个错，但是安装</a:t>
-            </a:r>
-            <a:r>
-              <a:rPr lang="en-GB" altLang="zh-CN" b="0" i="0" dirty="0" err="1">
-                <a:solidFill>
-                  <a:srgbClr val="1F2328"/>
-                </a:solidFill>
-                <a:effectLst/>
-                <a:latin typeface="-apple-system"/>
-              </a:rPr>
-              <a:t>numpy</a:t>
-            </a:r>
-            <a:r>
-              <a:rPr lang="en-GB" altLang="zh-CN" b="0" i="0" dirty="0">
-                <a:solidFill>
-                  <a:srgbClr val="1F2328"/>
-                </a:solidFill>
-                <a:effectLst/>
-                <a:latin typeface="-apple-system"/>
-              </a:rPr>
-              <a:t>==</a:t>
-            </a:r>
-            <a:r>
-              <a:rPr lang="en-US" altLang="zh-CN" b="0" i="0" dirty="0">
-                <a:solidFill>
-                  <a:srgbClr val="1F2328"/>
-                </a:solidFill>
-                <a:effectLst/>
-                <a:latin typeface="-apple-system"/>
-              </a:rPr>
-              <a:t>1.23.2</a:t>
-            </a:r>
-            <a:r>
-              <a:rPr lang="zh-CN" altLang="en-US" b="0" i="0" dirty="0">
-                <a:solidFill>
-                  <a:srgbClr val="1F2328"/>
-                </a:solidFill>
-                <a:effectLst/>
-                <a:latin typeface="-apple-system"/>
-              </a:rPr>
-              <a:t>版本就能正常运行了</a:t>
-            </a:r>
+              <a:t>Program.py line 98 </a:t>
+            </a:r>
+          </a:p>
+          <a:p>
+            <a:r>
+              <a:rPr lang="en-GB" sz="2000" b="0" dirty="0">
+                <a:solidFill>
+                  <a:srgbClr val="6A9955"/>
+                </a:solidFill>
+                <a:effectLst/>
+                <a:latin typeface="Consolas" panose="020B0609020204030204" pitchFamily="49" charset="0"/>
+              </a:rPr>
+              <a:t># device = '</a:t>
+            </a:r>
+            <a:r>
+              <a:rPr lang="en-GB" sz="2000" b="0" dirty="0" err="1">
+                <a:solidFill>
+                  <a:srgbClr val="6A9955"/>
+                </a:solidFill>
+                <a:effectLst/>
+                <a:latin typeface="Consolas" panose="020B0609020204030204" pitchFamily="49" charset="0"/>
+              </a:rPr>
+              <a:t>cuda</a:t>
+            </a:r>
+            <a:r>
+              <a:rPr lang="en-GB" sz="2000" b="0" dirty="0">
+                <a:solidFill>
+                  <a:srgbClr val="6A9955"/>
+                </a:solidFill>
+                <a:effectLst/>
+                <a:latin typeface="Consolas" panose="020B0609020204030204" pitchFamily="49" charset="0"/>
+              </a:rPr>
+              <a:t>:{}'.format(config['Global']['</a:t>
+            </a:r>
+            <a:r>
+              <a:rPr lang="en-GB" sz="2000" b="0" dirty="0" err="1">
+                <a:solidFill>
+                  <a:srgbClr val="6A9955"/>
+                </a:solidFill>
+                <a:effectLst/>
+                <a:latin typeface="Consolas" panose="020B0609020204030204" pitchFamily="49" charset="0"/>
+              </a:rPr>
+              <a:t>gpu_id</a:t>
+            </a:r>
+            <a:r>
+              <a:rPr lang="en-GB" sz="2000" b="0" dirty="0">
+                <a:solidFill>
+                  <a:srgbClr val="6A9955"/>
+                </a:solidFill>
+                <a:effectLst/>
+                <a:latin typeface="Consolas" panose="020B0609020204030204" pitchFamily="49" charset="0"/>
+              </a:rPr>
+              <a:t>']) if </a:t>
+            </a:r>
+            <a:r>
+              <a:rPr lang="en-GB" sz="2000" b="0" dirty="0" err="1">
+                <a:solidFill>
+                  <a:srgbClr val="6A9955"/>
+                </a:solidFill>
+                <a:effectLst/>
+                <a:latin typeface="Consolas" panose="020B0609020204030204" pitchFamily="49" charset="0"/>
+              </a:rPr>
+              <a:t>use_gpu</a:t>
+            </a:r>
+            <a:r>
+              <a:rPr lang="en-GB" sz="2000" b="0" dirty="0">
+                <a:solidFill>
+                  <a:srgbClr val="6A9955"/>
+                </a:solidFill>
+                <a:effectLst/>
+                <a:latin typeface="Consolas" panose="020B0609020204030204" pitchFamily="49" charset="0"/>
+              </a:rPr>
+              <a:t> else '</a:t>
+            </a:r>
+            <a:r>
+              <a:rPr lang="en-GB" sz="2000" b="0" dirty="0" err="1">
+                <a:solidFill>
+                  <a:srgbClr val="6A9955"/>
+                </a:solidFill>
+                <a:effectLst/>
+                <a:latin typeface="Consolas" panose="020B0609020204030204" pitchFamily="49" charset="0"/>
+              </a:rPr>
+              <a:t>cpu</a:t>
+            </a:r>
+            <a:r>
+              <a:rPr lang="en-GB" sz="2000" b="0" dirty="0">
+                <a:solidFill>
+                  <a:srgbClr val="6A9955"/>
+                </a:solidFill>
+                <a:effectLst/>
+                <a:latin typeface="Consolas" panose="020B0609020204030204" pitchFamily="49" charset="0"/>
+              </a:rPr>
+              <a:t>'</a:t>
+            </a:r>
+            <a:endParaRPr lang="en-GB" sz="2000" b="0" dirty="0">
+              <a:solidFill>
+                <a:srgbClr val="CCCCCC"/>
+              </a:solidFill>
+              <a:effectLst/>
+              <a:latin typeface="Consolas" panose="020B0609020204030204" pitchFamily="49" charset="0"/>
+            </a:endParaRPr>
+          </a:p>
+          <a:p>
             <a:endParaRPr lang="en-GB" dirty="0"/>
           </a:p>
         </p:txBody>
@@ -6446,7 +6119,7 @@
     </p:spTree>
     <p:extLst>
       <p:ext uri="{BB962C8B-B14F-4D97-AF65-F5344CB8AC3E}">
-        <p14:creationId xmlns:p14="http://schemas.microsoft.com/office/powerpoint/2010/main" val="2297757355"/>
+        <p14:creationId xmlns:p14="http://schemas.microsoft.com/office/powerpoint/2010/main" val="2806469842"/>
       </p:ext>
     </p:extLst>
   </p:cSld>
@@ -6478,6 +6151,500 @@
           <p:cNvPr id="2" name="Title 1">
             <a:extLst>
               <a:ext uri="{FF2B5EF4-FFF2-40B4-BE49-F238E27FC236}">
+                <a16:creationId xmlns:a16="http://schemas.microsoft.com/office/drawing/2014/main" id="{E670ECF5-BF7E-982E-A0B9-0C138C4DDA53}"/>
+              </a:ext>
+            </a:extLst>
+          </p:cNvPr>
+          <p:cNvSpPr>
+            <a:spLocks noGrp="1"/>
+          </p:cNvSpPr>
+          <p:nvPr>
+            <p:ph type="title"/>
+          </p:nvPr>
+        </p:nvSpPr>
+        <p:spPr/>
+        <p:txBody>
+          <a:bodyPr/>
+          <a:lstStyle/>
+          <a:p>
+            <a:r>
+              <a:rPr lang="en-GB" dirty="0"/>
+              <a:t>Error when parsing</a:t>
+            </a:r>
+          </a:p>
+        </p:txBody>
+      </p:sp>
+      <p:sp>
+        <p:nvSpPr>
+          <p:cNvPr id="3" name="Content Placeholder 2">
+            <a:extLst>
+              <a:ext uri="{FF2B5EF4-FFF2-40B4-BE49-F238E27FC236}">
+                <a16:creationId xmlns:a16="http://schemas.microsoft.com/office/drawing/2014/main" id="{EDF3AB5E-2C63-BA19-0C9C-B9205C55DB31}"/>
+              </a:ext>
+            </a:extLst>
+          </p:cNvPr>
+          <p:cNvSpPr>
+            <a:spLocks noGrp="1"/>
+          </p:cNvSpPr>
+          <p:nvPr>
+            <p:ph idx="1"/>
+          </p:nvPr>
+        </p:nvSpPr>
+        <p:spPr>
+          <a:xfrm>
+            <a:off x="403860" y="1825625"/>
+            <a:ext cx="11597640" cy="4072255"/>
+          </a:xfrm>
+        </p:spPr>
+        <p:txBody>
+          <a:bodyPr>
+            <a:noAutofit/>
+          </a:bodyPr>
+          <a:lstStyle/>
+          <a:p>
+            <a:pPr marL="0" indent="0">
+              <a:buNone/>
+            </a:pPr>
+            <a:r>
+              <a:rPr lang="en-GB" sz="1500" b="1" dirty="0"/>
+              <a:t> error happened with </a:t>
+            </a:r>
+            <a:r>
+              <a:rPr lang="en-GB" sz="1500" b="1" dirty="0" err="1"/>
+              <a:t>msg:Traceback</a:t>
+            </a:r>
+            <a:r>
+              <a:rPr lang="en-GB" sz="1500" b="1" dirty="0"/>
+              <a:t> (most recent call last):</a:t>
+            </a:r>
+          </a:p>
+          <a:p>
+            <a:pPr marL="0" indent="0">
+              <a:buNone/>
+            </a:pPr>
+            <a:r>
+              <a:rPr lang="en-GB" sz="1500" b="1" dirty="0"/>
+              <a:t>  File "C:\Users\PingChen\OneDrive - The University of Liverpool\Desktop\KYC </a:t>
+            </a:r>
+            <a:r>
+              <a:rPr lang="zh-TW" altLang="en-US" sz="1500" b="1" dirty="0"/>
+              <a:t>副業</a:t>
+            </a:r>
+            <a:r>
+              <a:rPr lang="en-US" altLang="zh-TW" sz="1500" b="1" dirty="0"/>
+              <a:t>\</a:t>
+            </a:r>
+            <a:r>
+              <a:rPr lang="en-GB" sz="1500" b="1" dirty="0"/>
+              <a:t>OCR\</a:t>
+            </a:r>
+            <a:r>
+              <a:rPr lang="en-GB" sz="1500" b="1" dirty="0" err="1"/>
+              <a:t>ocr_training_det</a:t>
+            </a:r>
+            <a:r>
+              <a:rPr lang="en-GB" sz="1500" b="1" dirty="0"/>
+              <a:t>\model\data\simple_dataset.py", line 131, in __</a:t>
+            </a:r>
+            <a:r>
+              <a:rPr lang="en-GB" sz="1500" b="1" dirty="0" err="1"/>
+              <a:t>getitem</a:t>
+            </a:r>
+            <a:r>
+              <a:rPr lang="en-GB" sz="1500" b="1" dirty="0"/>
+              <a:t>__</a:t>
+            </a:r>
+          </a:p>
+          <a:p>
+            <a:pPr marL="0" indent="0">
+              <a:buNone/>
+            </a:pPr>
+            <a:r>
+              <a:rPr lang="en-GB" sz="1500" b="1" dirty="0"/>
+              <a:t>    outs = transform(data, </a:t>
+            </a:r>
+            <a:r>
+              <a:rPr lang="en-GB" sz="1500" b="1" dirty="0" err="1"/>
+              <a:t>self.ops</a:t>
+            </a:r>
+            <a:r>
+              <a:rPr lang="en-GB" sz="1500" b="1" dirty="0"/>
+              <a:t>)</a:t>
+            </a:r>
+          </a:p>
+          <a:p>
+            <a:pPr marL="0" indent="0">
+              <a:buNone/>
+            </a:pPr>
+            <a:r>
+              <a:rPr lang="en-GB" sz="1500" b="1" dirty="0"/>
+              <a:t>  File "C:\Users\PingChen\OneDrive - The University of Liverpool\Desktop\KYC </a:t>
+            </a:r>
+            <a:r>
+              <a:rPr lang="zh-TW" altLang="en-US" sz="1500" b="1" dirty="0"/>
+              <a:t>副業</a:t>
+            </a:r>
+            <a:r>
+              <a:rPr lang="en-US" altLang="zh-TW" sz="1500" b="1" dirty="0"/>
+              <a:t>\</a:t>
+            </a:r>
+            <a:r>
+              <a:rPr lang="en-GB" sz="1500" b="1" dirty="0"/>
+              <a:t>OCR\</a:t>
+            </a:r>
+            <a:r>
+              <a:rPr lang="en-GB" sz="1500" b="1" dirty="0" err="1"/>
+              <a:t>ocr_training_det</a:t>
+            </a:r>
+            <a:r>
+              <a:rPr lang="en-GB" sz="1500" b="1" dirty="0"/>
+              <a:t>\model\data\</a:t>
+            </a:r>
+            <a:r>
+              <a:rPr lang="en-GB" sz="1500" b="1" dirty="0" err="1"/>
+              <a:t>imaug</a:t>
+            </a:r>
+            <a:r>
+              <a:rPr lang="en-GB" sz="1500" b="1" dirty="0"/>
+              <a:t>\__init__.py", line 13, in transform</a:t>
+            </a:r>
+          </a:p>
+          <a:p>
+            <a:pPr marL="0" indent="0">
+              <a:buNone/>
+            </a:pPr>
+            <a:r>
+              <a:rPr lang="en-GB" sz="1500" b="1" dirty="0"/>
+              <a:t>    data = op(data)</a:t>
+            </a:r>
+          </a:p>
+          <a:p>
+            <a:pPr marL="0" indent="0">
+              <a:buNone/>
+            </a:pPr>
+            <a:r>
+              <a:rPr lang="en-GB" sz="1500" b="1" dirty="0"/>
+              <a:t>  File "C:\Users\PingChen\OneDrive - The University of Liverpool\Desktop\KYC </a:t>
+            </a:r>
+            <a:r>
+              <a:rPr lang="zh-TW" altLang="en-US" sz="1500" b="1" dirty="0"/>
+              <a:t>副業</a:t>
+            </a:r>
+            <a:r>
+              <a:rPr lang="en-US" altLang="zh-TW" sz="1500" b="1" dirty="0"/>
+              <a:t>\</a:t>
+            </a:r>
+            <a:r>
+              <a:rPr lang="en-GB" sz="1500" b="1" dirty="0"/>
+              <a:t>OCR\</a:t>
+            </a:r>
+            <a:r>
+              <a:rPr lang="en-GB" sz="1500" b="1" dirty="0" err="1"/>
+              <a:t>ocr_training_det</a:t>
+            </a:r>
+            <a:r>
+              <a:rPr lang="en-GB" sz="1500" b="1" dirty="0"/>
+              <a:t>\model\data\</a:t>
+            </a:r>
+            <a:r>
+              <a:rPr lang="en-GB" sz="1500" b="1" dirty="0" err="1"/>
+              <a:t>imaug</a:t>
+            </a:r>
+            <a:r>
+              <a:rPr lang="en-GB" sz="1500" b="1" dirty="0"/>
+              <a:t>\label_ops.py", line 28, in __call__</a:t>
+            </a:r>
+          </a:p>
+          <a:p>
+            <a:pPr marL="0" indent="0">
+              <a:buNone/>
+            </a:pPr>
+            <a:r>
+              <a:rPr lang="en-GB" sz="1500" b="1" dirty="0"/>
+              <a:t>    </a:t>
+            </a:r>
+            <a:r>
+              <a:rPr lang="en-GB" sz="1500" b="1" dirty="0" err="1"/>
+              <a:t>txt_tags</a:t>
+            </a:r>
+            <a:r>
+              <a:rPr lang="en-GB" sz="1500" b="1" dirty="0"/>
+              <a:t> = </a:t>
+            </a:r>
+            <a:r>
+              <a:rPr lang="en-GB" sz="1500" b="1" dirty="0" err="1"/>
+              <a:t>np.array</a:t>
+            </a:r>
+            <a:r>
+              <a:rPr lang="en-GB" sz="1500" b="1" dirty="0"/>
+              <a:t>(</a:t>
+            </a:r>
+            <a:r>
+              <a:rPr lang="en-GB" sz="1500" b="1" dirty="0" err="1"/>
+              <a:t>txt_tags,dtype</a:t>
+            </a:r>
+            <a:r>
+              <a:rPr lang="en-GB" sz="1500" b="1" dirty="0"/>
+              <a:t>=</a:t>
+            </a:r>
+            <a:r>
+              <a:rPr lang="en-GB" sz="1500" b="1" dirty="0" err="1"/>
+              <a:t>np.bool</a:t>
+            </a:r>
+            <a:r>
+              <a:rPr lang="en-GB" sz="1500" b="1" dirty="0"/>
+              <a:t>)</a:t>
+            </a:r>
+          </a:p>
+          <a:p>
+            <a:pPr marL="0" indent="0">
+              <a:buNone/>
+            </a:pPr>
+            <a:r>
+              <a:rPr lang="en-GB" sz="1500" b="1" dirty="0"/>
+              <a:t>  File "C:\Users\PingChen\AppData\Local\anaconda3\envs\OCR_test\lib\site-packages\numpy\__init__.py", line 305, in __</a:t>
+            </a:r>
+            <a:r>
+              <a:rPr lang="en-GB" sz="1500" b="1" dirty="0" err="1"/>
+              <a:t>getattr</a:t>
+            </a:r>
+            <a:r>
+              <a:rPr lang="en-GB" sz="1500" b="1" dirty="0"/>
+              <a:t>__</a:t>
+            </a:r>
+          </a:p>
+          <a:p>
+            <a:pPr marL="0" indent="0">
+              <a:buNone/>
+            </a:pPr>
+            <a:r>
+              <a:rPr lang="en-GB" sz="1500" b="1" dirty="0"/>
+              <a:t>    raise </a:t>
+            </a:r>
+            <a:r>
+              <a:rPr lang="en-GB" sz="1500" b="1" dirty="0" err="1"/>
+              <a:t>AttributeError</a:t>
+            </a:r>
+            <a:r>
+              <a:rPr lang="en-GB" sz="1500" b="1" dirty="0"/>
+              <a:t>(__</a:t>
+            </a:r>
+            <a:r>
+              <a:rPr lang="en-GB" sz="1500" b="1" dirty="0" err="1"/>
+              <a:t>former_attrs</a:t>
+            </a:r>
+            <a:r>
+              <a:rPr lang="en-GB" sz="1500" b="1" dirty="0"/>
+              <a:t>__[</a:t>
+            </a:r>
+            <a:r>
+              <a:rPr lang="en-GB" sz="1500" b="1" dirty="0" err="1"/>
+              <a:t>attr</a:t>
+            </a:r>
+            <a:r>
+              <a:rPr lang="en-GB" sz="1500" b="1" dirty="0"/>
+              <a:t>])</a:t>
+            </a:r>
+          </a:p>
+          <a:p>
+            <a:pPr marL="0" indent="0">
+              <a:buNone/>
+            </a:pPr>
+            <a:r>
+              <a:rPr lang="en-GB" sz="1500" b="1" dirty="0" err="1"/>
+              <a:t>AttributeError</a:t>
+            </a:r>
+            <a:r>
+              <a:rPr lang="en-GB" sz="1500" b="1" dirty="0"/>
+              <a:t>: module '</a:t>
+            </a:r>
+            <a:r>
+              <a:rPr lang="en-GB" sz="1500" b="1" dirty="0" err="1"/>
+              <a:t>numpy</a:t>
+            </a:r>
+            <a:r>
+              <a:rPr lang="en-GB" sz="1500" b="1" dirty="0"/>
+              <a:t>' has no attribute 'bool'.</a:t>
+            </a:r>
+          </a:p>
+          <a:p>
+            <a:pPr marL="0" indent="0">
+              <a:buNone/>
+            </a:pPr>
+            <a:r>
+              <a:rPr lang="en-GB" sz="1500" b="1" dirty="0"/>
+              <a:t>https://numpy.org/devdocs/release/1.20.0-notes.html#deprecations</a:t>
+            </a:r>
+          </a:p>
+        </p:txBody>
+      </p:sp>
+      <p:sp>
+        <p:nvSpPr>
+          <p:cNvPr id="4" name="TextBox 3">
+            <a:extLst>
+              <a:ext uri="{FF2B5EF4-FFF2-40B4-BE49-F238E27FC236}">
+                <a16:creationId xmlns:a16="http://schemas.microsoft.com/office/drawing/2014/main" id="{7CE2F764-0241-072F-CBFC-06F8C3161EA4}"/>
+              </a:ext>
+            </a:extLst>
+          </p:cNvPr>
+          <p:cNvSpPr txBox="1"/>
+          <p:nvPr/>
+        </p:nvSpPr>
+        <p:spPr>
+          <a:xfrm>
+            <a:off x="1836420" y="6256020"/>
+            <a:ext cx="9281160" cy="646331"/>
+          </a:xfrm>
+          <a:prstGeom prst="rect">
+            <a:avLst/>
+          </a:prstGeom>
+          <a:noFill/>
+        </p:spPr>
+        <p:txBody>
+          <a:bodyPr wrap="square" rtlCol="0">
+            <a:spAutoFit/>
+          </a:bodyPr>
+          <a:lstStyle/>
+          <a:p>
+            <a:r>
+              <a:rPr lang="en-US" altLang="zh-CN" b="0" i="0" dirty="0" err="1">
+                <a:solidFill>
+                  <a:srgbClr val="1F2328"/>
+                </a:solidFill>
+                <a:effectLst/>
+                <a:latin typeface="-apple-system"/>
+              </a:rPr>
+              <a:t>numpy</a:t>
+            </a:r>
+            <a:r>
+              <a:rPr lang="zh-CN" altLang="en-US" b="0" i="0" dirty="0">
+                <a:solidFill>
+                  <a:srgbClr val="1F2328"/>
+                </a:solidFill>
+                <a:effectLst/>
+                <a:latin typeface="-apple-system"/>
+              </a:rPr>
+              <a:t>版本尝试了</a:t>
+            </a:r>
+            <a:r>
+              <a:rPr lang="en-US" altLang="zh-CN" b="0" i="0" dirty="0">
+                <a:solidFill>
+                  <a:srgbClr val="1F2328"/>
+                </a:solidFill>
+                <a:effectLst/>
+                <a:latin typeface="-apple-system"/>
+              </a:rPr>
+              <a:t>1.24.4</a:t>
+            </a:r>
+            <a:r>
+              <a:rPr lang="zh-CN" altLang="en-US" b="0" i="0" dirty="0">
+                <a:solidFill>
+                  <a:srgbClr val="1F2328"/>
+                </a:solidFill>
+                <a:effectLst/>
+                <a:latin typeface="-apple-system"/>
+              </a:rPr>
+              <a:t>和</a:t>
+            </a:r>
+            <a:r>
+              <a:rPr lang="en-US" altLang="zh-CN" b="0" i="0" dirty="0">
+                <a:solidFill>
+                  <a:srgbClr val="1F2328"/>
+                </a:solidFill>
+                <a:effectLst/>
+                <a:latin typeface="-apple-system"/>
+              </a:rPr>
+              <a:t>1.24.3</a:t>
+            </a:r>
+            <a:r>
+              <a:rPr lang="zh-CN" altLang="en-US" b="0" i="0" dirty="0">
+                <a:solidFill>
+                  <a:srgbClr val="1F2328"/>
+                </a:solidFill>
+                <a:effectLst/>
+                <a:latin typeface="-apple-system"/>
+              </a:rPr>
+              <a:t>，都会报这个错，但是安装</a:t>
+            </a:r>
+            <a:r>
+              <a:rPr lang="en-GB" altLang="zh-CN" b="0" i="0" dirty="0" err="1">
+                <a:solidFill>
+                  <a:srgbClr val="1F2328"/>
+                </a:solidFill>
+                <a:effectLst/>
+                <a:latin typeface="-apple-system"/>
+              </a:rPr>
+              <a:t>numpy</a:t>
+            </a:r>
+            <a:r>
+              <a:rPr lang="en-GB" altLang="zh-CN" b="0" i="0" dirty="0">
+                <a:solidFill>
+                  <a:srgbClr val="1F2328"/>
+                </a:solidFill>
+                <a:effectLst/>
+                <a:latin typeface="-apple-system"/>
+              </a:rPr>
+              <a:t>==</a:t>
+            </a:r>
+            <a:r>
+              <a:rPr lang="en-US" altLang="zh-CN" b="0" i="0" dirty="0">
+                <a:solidFill>
+                  <a:srgbClr val="1F2328"/>
+                </a:solidFill>
+                <a:effectLst/>
+                <a:latin typeface="-apple-system"/>
+              </a:rPr>
+              <a:t>1.23.2</a:t>
+            </a:r>
+            <a:r>
+              <a:rPr lang="zh-CN" altLang="en-US" b="0" i="0" dirty="0">
+                <a:solidFill>
+                  <a:srgbClr val="1F2328"/>
+                </a:solidFill>
+                <a:effectLst/>
+                <a:latin typeface="-apple-system"/>
+              </a:rPr>
+              <a:t>版本就能正常运行了</a:t>
+            </a:r>
+            <a:endParaRPr lang="en-GB" dirty="0"/>
+          </a:p>
+        </p:txBody>
+      </p:sp>
+    </p:spTree>
+    <p:extLst>
+      <p:ext uri="{BB962C8B-B14F-4D97-AF65-F5344CB8AC3E}">
+        <p14:creationId xmlns:p14="http://schemas.microsoft.com/office/powerpoint/2010/main" val="2297757355"/>
+      </p:ext>
+    </p:extLst>
+  </p:cSld>
+  <p:clrMapOvr>
+    <a:masterClrMapping/>
+  </p:clrMapOvr>
+</p:sld>
+</file>
+
+<file path=ppt/slides/slide17.xml><?xml version="1.0" encoding="utf-8"?>
+<p:sld xmlns:a="http://schemas.openxmlformats.org/drawingml/2006/main" xmlns:r="http://schemas.openxmlformats.org/officeDocument/2006/relationships" xmlns:p="http://schemas.openxmlformats.org/presentationml/2006/main">
+  <p:cSld>
+    <p:spTree>
+      <p:nvGrpSpPr>
+        <p:cNvPr id="1" name=""/>
+        <p:cNvGrpSpPr/>
+        <p:nvPr/>
+      </p:nvGrpSpPr>
+      <p:grpSpPr>
+        <a:xfrm>
+          <a:off x="0" y="0"/>
+          <a:ext cx="0" cy="0"/>
+          <a:chOff x="0" y="0"/>
+          <a:chExt cx="0" cy="0"/>
+        </a:xfrm>
+      </p:grpSpPr>
+      <p:sp>
+        <p:nvSpPr>
+          <p:cNvPr id="2" name="Title 1">
+            <a:extLst>
+              <a:ext uri="{FF2B5EF4-FFF2-40B4-BE49-F238E27FC236}">
                 <a16:creationId xmlns:a16="http://schemas.microsoft.com/office/drawing/2014/main" id="{06286F4E-223A-02FE-50C3-1511941728ED}"/>
               </a:ext>
             </a:extLst>
@@ -6617,6 +6784,499 @@
     <p:extLst>
       <p:ext uri="{BB962C8B-B14F-4D97-AF65-F5344CB8AC3E}">
         <p14:creationId xmlns:p14="http://schemas.microsoft.com/office/powerpoint/2010/main" val="1563633422"/>
+      </p:ext>
+    </p:extLst>
+  </p:cSld>
+  <p:clrMapOvr>
+    <a:masterClrMapping/>
+  </p:clrMapOvr>
+</p:sld>
+</file>
+
+<file path=ppt/slides/slide18.xml><?xml version="1.0" encoding="utf-8"?>
+<p:sld xmlns:a="http://schemas.openxmlformats.org/drawingml/2006/main" xmlns:r="http://schemas.openxmlformats.org/officeDocument/2006/relationships" xmlns:p="http://schemas.openxmlformats.org/presentationml/2006/main">
+  <p:cSld>
+    <p:spTree>
+      <p:nvGrpSpPr>
+        <p:cNvPr id="1" name=""/>
+        <p:cNvGrpSpPr/>
+        <p:nvPr/>
+      </p:nvGrpSpPr>
+      <p:grpSpPr>
+        <a:xfrm>
+          <a:off x="0" y="0"/>
+          <a:ext cx="0" cy="0"/>
+          <a:chOff x="0" y="0"/>
+          <a:chExt cx="0" cy="0"/>
+        </a:xfrm>
+      </p:grpSpPr>
+      <p:sp>
+        <p:nvSpPr>
+          <p:cNvPr id="2" name="Title 1">
+            <a:extLst>
+              <a:ext uri="{FF2B5EF4-FFF2-40B4-BE49-F238E27FC236}">
+                <a16:creationId xmlns:a16="http://schemas.microsoft.com/office/drawing/2014/main" id="{BEE0F620-552A-DA4A-2C3A-2664F6AC6B2F}"/>
+              </a:ext>
+            </a:extLst>
+          </p:cNvPr>
+          <p:cNvSpPr>
+            <a:spLocks noGrp="1"/>
+          </p:cNvSpPr>
+          <p:nvPr>
+            <p:ph type="title"/>
+          </p:nvPr>
+        </p:nvSpPr>
+        <p:spPr/>
+        <p:txBody>
+          <a:bodyPr/>
+          <a:lstStyle/>
+          <a:p>
+            <a:r>
+              <a:rPr lang="en-US" altLang="zh-CN" dirty="0"/>
+              <a:t>Training error: weight cannot be loaded to </a:t>
+            </a:r>
+            <a:r>
+              <a:rPr lang="en-US" altLang="zh-CN" dirty="0" err="1"/>
+              <a:t>cuda</a:t>
+            </a:r>
+            <a:endParaRPr lang="en-GB" dirty="0"/>
+          </a:p>
+        </p:txBody>
+      </p:sp>
+      <p:sp>
+        <p:nvSpPr>
+          <p:cNvPr id="3" name="Content Placeholder 2">
+            <a:extLst>
+              <a:ext uri="{FF2B5EF4-FFF2-40B4-BE49-F238E27FC236}">
+                <a16:creationId xmlns:a16="http://schemas.microsoft.com/office/drawing/2014/main" id="{4CBCAD23-C501-5F7D-EF88-491044C0E9C1}"/>
+              </a:ext>
+            </a:extLst>
+          </p:cNvPr>
+          <p:cNvSpPr>
+            <a:spLocks noGrp="1"/>
+          </p:cNvSpPr>
+          <p:nvPr>
+            <p:ph idx="1"/>
+          </p:nvPr>
+        </p:nvSpPr>
+        <p:spPr/>
+        <p:txBody>
+          <a:bodyPr/>
+          <a:lstStyle/>
+          <a:p>
+            <a:r>
+              <a:rPr lang="en-GB" b="0" i="0" dirty="0" err="1">
+                <a:solidFill>
+                  <a:srgbClr val="202124"/>
+                </a:solidFill>
+                <a:effectLst/>
+                <a:latin typeface="Roboto" panose="02000000000000000000" pitchFamily="2" charset="0"/>
+              </a:rPr>
+              <a:t>RuntimeError</a:t>
+            </a:r>
+            <a:r>
+              <a:rPr lang="en-GB" b="0" i="0" dirty="0">
+                <a:solidFill>
+                  <a:srgbClr val="202124"/>
+                </a:solidFill>
+                <a:effectLst/>
+                <a:latin typeface="Roboto" panose="02000000000000000000" pitchFamily="2" charset="0"/>
+              </a:rPr>
+              <a:t>: Input type (</a:t>
+            </a:r>
+            <a:r>
+              <a:rPr lang="en-GB" b="0" i="0" dirty="0" err="1">
+                <a:solidFill>
+                  <a:srgbClr val="202124"/>
+                </a:solidFill>
+                <a:effectLst/>
+                <a:latin typeface="Roboto" panose="02000000000000000000" pitchFamily="2" charset="0"/>
+              </a:rPr>
+              <a:t>torch.cuda.FloatTensor</a:t>
+            </a:r>
+            <a:r>
+              <a:rPr lang="en-GB" b="0" i="0" dirty="0">
+                <a:solidFill>
+                  <a:srgbClr val="202124"/>
+                </a:solidFill>
+                <a:effectLst/>
+                <a:latin typeface="Roboto" panose="02000000000000000000" pitchFamily="2" charset="0"/>
+              </a:rPr>
+              <a:t>) and weight type (</a:t>
+            </a:r>
+            <a:r>
+              <a:rPr lang="en-GB" b="0" i="0" dirty="0" err="1">
+                <a:solidFill>
+                  <a:srgbClr val="202124"/>
+                </a:solidFill>
+                <a:effectLst/>
+                <a:latin typeface="Roboto" panose="02000000000000000000" pitchFamily="2" charset="0"/>
+              </a:rPr>
+              <a:t>torch.FloatTensor</a:t>
+            </a:r>
+            <a:r>
+              <a:rPr lang="en-GB" b="0" i="0">
+                <a:solidFill>
+                  <a:srgbClr val="202124"/>
+                </a:solidFill>
+                <a:effectLst/>
+                <a:latin typeface="Roboto" panose="02000000000000000000" pitchFamily="2" charset="0"/>
+              </a:rPr>
+              <a:t>) should be the same</a:t>
+            </a:r>
+            <a:endParaRPr lang="en-GB"/>
+          </a:p>
+        </p:txBody>
+      </p:sp>
+    </p:spTree>
+    <p:extLst>
+      <p:ext uri="{BB962C8B-B14F-4D97-AF65-F5344CB8AC3E}">
+        <p14:creationId xmlns:p14="http://schemas.microsoft.com/office/powerpoint/2010/main" val="3388768162"/>
+      </p:ext>
+    </p:extLst>
+  </p:cSld>
+  <p:clrMapOvr>
+    <a:masterClrMapping/>
+  </p:clrMapOvr>
+</p:sld>
+</file>
+
+<file path=ppt/slides/slide19.xml><?xml version="1.0" encoding="utf-8"?>
+<p:sld xmlns:a="http://schemas.openxmlformats.org/drawingml/2006/main" xmlns:r="http://schemas.openxmlformats.org/officeDocument/2006/relationships" xmlns:p="http://schemas.openxmlformats.org/presentationml/2006/main">
+  <p:cSld>
+    <p:spTree>
+      <p:nvGrpSpPr>
+        <p:cNvPr id="1" name=""/>
+        <p:cNvGrpSpPr/>
+        <p:nvPr/>
+      </p:nvGrpSpPr>
+      <p:grpSpPr>
+        <a:xfrm>
+          <a:off x="0" y="0"/>
+          <a:ext cx="0" cy="0"/>
+          <a:chOff x="0" y="0"/>
+          <a:chExt cx="0" cy="0"/>
+        </a:xfrm>
+      </p:grpSpPr>
+      <p:sp>
+        <p:nvSpPr>
+          <p:cNvPr id="2" name="Title 1">
+            <a:extLst>
+              <a:ext uri="{FF2B5EF4-FFF2-40B4-BE49-F238E27FC236}">
+                <a16:creationId xmlns:a16="http://schemas.microsoft.com/office/drawing/2014/main" id="{EB16C9B9-4BF3-9062-E84F-A4CAC817943F}"/>
+              </a:ext>
+            </a:extLst>
+          </p:cNvPr>
+          <p:cNvSpPr>
+            <a:spLocks noGrp="1"/>
+          </p:cNvSpPr>
+          <p:nvPr>
+            <p:ph type="title"/>
+          </p:nvPr>
+        </p:nvSpPr>
+        <p:spPr/>
+        <p:txBody>
+          <a:bodyPr/>
+          <a:lstStyle/>
+          <a:p>
+            <a:r>
+              <a:rPr lang="en-GB" dirty="0"/>
+              <a:t>OCR_INFER</a:t>
+            </a:r>
+          </a:p>
+        </p:txBody>
+      </p:sp>
+      <p:sp>
+        <p:nvSpPr>
+          <p:cNvPr id="3" name="Content Placeholder 2">
+            <a:extLst>
+              <a:ext uri="{FF2B5EF4-FFF2-40B4-BE49-F238E27FC236}">
+                <a16:creationId xmlns:a16="http://schemas.microsoft.com/office/drawing/2014/main" id="{86B5C663-647B-7DFA-2853-D20B6F37872E}"/>
+              </a:ext>
+            </a:extLst>
+          </p:cNvPr>
+          <p:cNvSpPr>
+            <a:spLocks noGrp="1"/>
+          </p:cNvSpPr>
+          <p:nvPr>
+            <p:ph idx="1"/>
+          </p:nvPr>
+        </p:nvSpPr>
+        <p:spPr/>
+        <p:txBody>
+          <a:bodyPr/>
+          <a:lstStyle/>
+          <a:p>
+            <a:r>
+              <a:rPr lang="en-US" altLang="zh-CN" sz="1800" dirty="0">
+                <a:latin typeface="Consolas" panose="020B0609020204030204" pitchFamily="49" charset="0"/>
+              </a:rPr>
+              <a:t>tools\infer\</a:t>
+            </a:r>
+            <a:r>
+              <a:rPr lang="en-US" altLang="zh-CN" sz="1800" b="0" dirty="0">
+                <a:effectLst/>
+                <a:latin typeface="Consolas" panose="020B0609020204030204" pitchFamily="49" charset="0"/>
+              </a:rPr>
+              <a:t>predict_det.py</a:t>
+            </a:r>
+            <a:r>
+              <a:rPr lang="zh-CN" altLang="en-US" sz="1800" b="0" dirty="0">
+                <a:effectLst/>
+                <a:latin typeface="Consolas" panose="020B0609020204030204" pitchFamily="49" charset="0"/>
+              </a:rPr>
+              <a:t>中</a:t>
+            </a:r>
+            <a:endParaRPr lang="en-GB" sz="1800" b="0" dirty="0">
+              <a:effectLst/>
+              <a:latin typeface="Consolas" panose="020B0609020204030204" pitchFamily="49" charset="0"/>
+            </a:endParaRPr>
+          </a:p>
+          <a:p>
+            <a:r>
+              <a:rPr lang="en-GB" sz="1800" b="0" dirty="0">
+                <a:solidFill>
+                  <a:srgbClr val="C586C0"/>
+                </a:solidFill>
+                <a:effectLst/>
+                <a:latin typeface="Consolas" panose="020B0609020204030204" pitchFamily="49" charset="0"/>
+              </a:rPr>
+              <a:t>from</a:t>
+            </a:r>
+            <a:r>
+              <a:rPr lang="en-GB" sz="1800" b="0" dirty="0">
+                <a:solidFill>
+                  <a:srgbClr val="CCCCCC"/>
+                </a:solidFill>
+                <a:effectLst/>
+                <a:latin typeface="Consolas" panose="020B0609020204030204" pitchFamily="49" charset="0"/>
+              </a:rPr>
+              <a:t> </a:t>
+            </a:r>
+            <a:r>
+              <a:rPr lang="en-GB" sz="1800" b="0" dirty="0" err="1">
+                <a:solidFill>
+                  <a:srgbClr val="4EC9B0"/>
+                </a:solidFill>
+                <a:effectLst/>
+                <a:latin typeface="Consolas" panose="020B0609020204030204" pitchFamily="49" charset="0"/>
+              </a:rPr>
+              <a:t>pytorchocr</a:t>
+            </a:r>
+            <a:r>
+              <a:rPr lang="en-GB" sz="1800" b="0" dirty="0" err="1">
+                <a:solidFill>
+                  <a:srgbClr val="CCCCCC"/>
+                </a:solidFill>
+                <a:effectLst/>
+                <a:latin typeface="Consolas" panose="020B0609020204030204" pitchFamily="49" charset="0"/>
+              </a:rPr>
+              <a:t>.</a:t>
+            </a:r>
+            <a:r>
+              <a:rPr lang="en-GB" sz="1800" b="0" dirty="0" err="1">
+                <a:solidFill>
+                  <a:srgbClr val="4EC9B0"/>
+                </a:solidFill>
+                <a:effectLst/>
+                <a:latin typeface="Consolas" panose="020B0609020204030204" pitchFamily="49" charset="0"/>
+              </a:rPr>
+              <a:t>utils</a:t>
+            </a:r>
+            <a:r>
+              <a:rPr lang="en-GB" sz="1800" b="0" dirty="0" err="1">
+                <a:solidFill>
+                  <a:srgbClr val="CCCCCC"/>
+                </a:solidFill>
+                <a:effectLst/>
+                <a:latin typeface="Consolas" panose="020B0609020204030204" pitchFamily="49" charset="0"/>
+              </a:rPr>
+              <a:t>.</a:t>
+            </a:r>
+            <a:r>
+              <a:rPr lang="en-GB" sz="1800" b="0" dirty="0" err="1">
+                <a:solidFill>
+                  <a:srgbClr val="4EC9B0"/>
+                </a:solidFill>
+                <a:effectLst/>
+                <a:latin typeface="Consolas" panose="020B0609020204030204" pitchFamily="49" charset="0"/>
+              </a:rPr>
+              <a:t>utility</a:t>
+            </a:r>
+            <a:r>
+              <a:rPr lang="en-GB" sz="1800" b="0" dirty="0">
+                <a:solidFill>
+                  <a:srgbClr val="CCCCCC"/>
+                </a:solidFill>
+                <a:effectLst/>
+                <a:latin typeface="Consolas" panose="020B0609020204030204" pitchFamily="49" charset="0"/>
+              </a:rPr>
+              <a:t> </a:t>
+            </a:r>
+            <a:r>
+              <a:rPr lang="en-GB" sz="1800" b="0" dirty="0">
+                <a:solidFill>
+                  <a:srgbClr val="C586C0"/>
+                </a:solidFill>
+                <a:effectLst/>
+                <a:latin typeface="Consolas" panose="020B0609020204030204" pitchFamily="49" charset="0"/>
+              </a:rPr>
+              <a:t>import</a:t>
+            </a:r>
+            <a:r>
+              <a:rPr lang="en-GB" sz="1800" b="0" dirty="0">
+                <a:solidFill>
+                  <a:srgbClr val="CCCCCC"/>
+                </a:solidFill>
+                <a:effectLst/>
+                <a:latin typeface="Consolas" panose="020B0609020204030204" pitchFamily="49" charset="0"/>
+              </a:rPr>
+              <a:t> </a:t>
+            </a:r>
+            <a:r>
+              <a:rPr lang="en-GB" sz="1800" b="0" dirty="0" err="1">
+                <a:solidFill>
+                  <a:srgbClr val="DCDCAA"/>
+                </a:solidFill>
+                <a:effectLst/>
+                <a:latin typeface="Consolas" panose="020B0609020204030204" pitchFamily="49" charset="0"/>
+              </a:rPr>
+              <a:t>get_image_file_list</a:t>
+            </a:r>
+            <a:r>
+              <a:rPr lang="en-GB" sz="1800" b="0" dirty="0">
+                <a:solidFill>
+                  <a:srgbClr val="CCCCCC"/>
+                </a:solidFill>
+                <a:effectLst/>
+                <a:latin typeface="Consolas" panose="020B0609020204030204" pitchFamily="49" charset="0"/>
+              </a:rPr>
+              <a:t>, </a:t>
+            </a:r>
+            <a:r>
+              <a:rPr lang="en-GB" sz="1800" b="0" dirty="0" err="1">
+                <a:solidFill>
+                  <a:srgbClr val="DCDCAA"/>
+                </a:solidFill>
+                <a:effectLst/>
+                <a:latin typeface="Consolas" panose="020B0609020204030204" pitchFamily="49" charset="0"/>
+              </a:rPr>
+              <a:t>check_and_read_gif</a:t>
+            </a:r>
+            <a:endParaRPr lang="en-GB" sz="1800" b="0" dirty="0">
+              <a:solidFill>
+                <a:srgbClr val="DCDCAA"/>
+              </a:solidFill>
+              <a:effectLst/>
+              <a:latin typeface="Consolas" panose="020B0609020204030204" pitchFamily="49" charset="0"/>
+            </a:endParaRPr>
+          </a:p>
+          <a:p>
+            <a:r>
+              <a:rPr lang="zh-CN" altLang="en-US" sz="1800" b="0" dirty="0">
+                <a:solidFill>
+                  <a:srgbClr val="4EC9B0"/>
+                </a:solidFill>
+                <a:effectLst/>
+                <a:latin typeface="Consolas" panose="020B0609020204030204" pitchFamily="49" charset="0"/>
+              </a:rPr>
+              <a:t>把</a:t>
+            </a:r>
+            <a:r>
+              <a:rPr lang="en-GB" sz="1800" b="0" dirty="0" err="1">
+                <a:solidFill>
+                  <a:srgbClr val="4EC9B0"/>
+                </a:solidFill>
+                <a:effectLst/>
+                <a:latin typeface="Consolas" panose="020B0609020204030204" pitchFamily="49" charset="0"/>
+              </a:rPr>
+              <a:t>pytorchocr</a:t>
+            </a:r>
+            <a:r>
+              <a:rPr lang="en-GB" sz="1800" b="0" dirty="0" err="1">
+                <a:solidFill>
+                  <a:srgbClr val="CCCCCC"/>
+                </a:solidFill>
+                <a:effectLst/>
+                <a:latin typeface="Consolas" panose="020B0609020204030204" pitchFamily="49" charset="0"/>
+              </a:rPr>
+              <a:t>.</a:t>
+            </a:r>
+            <a:r>
+              <a:rPr lang="en-GB" sz="1800" b="0" dirty="0" err="1">
+                <a:solidFill>
+                  <a:srgbClr val="4EC9B0"/>
+                </a:solidFill>
+                <a:effectLst/>
+                <a:latin typeface="Consolas" panose="020B0609020204030204" pitchFamily="49" charset="0"/>
+              </a:rPr>
+              <a:t>utils</a:t>
+            </a:r>
+            <a:r>
+              <a:rPr lang="en-GB" sz="1800" b="0" dirty="0" err="1">
+                <a:solidFill>
+                  <a:srgbClr val="CCCCCC"/>
+                </a:solidFill>
+                <a:effectLst/>
+                <a:latin typeface="Consolas" panose="020B0609020204030204" pitchFamily="49" charset="0"/>
+              </a:rPr>
+              <a:t>.</a:t>
+            </a:r>
+            <a:r>
+              <a:rPr lang="en-GB" sz="1800" b="0" dirty="0" err="1">
+                <a:solidFill>
+                  <a:srgbClr val="4EC9B0"/>
+                </a:solidFill>
+                <a:effectLst/>
+                <a:latin typeface="Consolas" panose="020B0609020204030204" pitchFamily="49" charset="0"/>
+              </a:rPr>
+              <a:t>utility</a:t>
+            </a:r>
+            <a:r>
+              <a:rPr lang="zh-CN" altLang="en-US" sz="1800" b="0" dirty="0">
+                <a:solidFill>
+                  <a:srgbClr val="4EC9B0"/>
+                </a:solidFill>
+                <a:effectLst/>
+                <a:latin typeface="Consolas" panose="020B0609020204030204" pitchFamily="49" charset="0"/>
+              </a:rPr>
+              <a:t>一些</a:t>
+            </a:r>
+            <a:r>
+              <a:rPr lang="en-US" altLang="zh-CN" sz="1800" dirty="0">
+                <a:solidFill>
+                  <a:srgbClr val="4EC9B0"/>
+                </a:solidFill>
+                <a:latin typeface="Consolas" panose="020B0609020204030204" pitchFamily="49" charset="0"/>
+              </a:rPr>
+              <a:t>inference</a:t>
+            </a:r>
+            <a:r>
+              <a:rPr lang="zh-CN" altLang="en-US" sz="1800">
+                <a:solidFill>
+                  <a:srgbClr val="4EC9B0"/>
+                </a:solidFill>
+                <a:latin typeface="Consolas" panose="020B0609020204030204" pitchFamily="49" charset="0"/>
+              </a:rPr>
+              <a:t>細節抄起來就可以了</a:t>
+            </a:r>
+            <a:endParaRPr lang="en-GB" sz="1800" b="0" dirty="0">
+              <a:solidFill>
+                <a:srgbClr val="CCCCCC"/>
+              </a:solidFill>
+              <a:effectLst/>
+              <a:latin typeface="Consolas" panose="020B0609020204030204" pitchFamily="49" charset="0"/>
+            </a:endParaRPr>
+          </a:p>
+          <a:p>
+            <a:endParaRPr lang="en-GB" dirty="0"/>
+          </a:p>
+        </p:txBody>
+      </p:sp>
+    </p:spTree>
+    <p:extLst>
+      <p:ext uri="{BB962C8B-B14F-4D97-AF65-F5344CB8AC3E}">
+        <p14:creationId xmlns:p14="http://schemas.microsoft.com/office/powerpoint/2010/main" val="799057516"/>
       </p:ext>
     </p:extLst>
   </p:cSld>
@@ -9002,7 +9662,7 @@
           <p:cNvPr id="2" name="Title 1">
             <a:extLst>
               <a:ext uri="{FF2B5EF4-FFF2-40B4-BE49-F238E27FC236}">
-                <a16:creationId xmlns:a16="http://schemas.microsoft.com/office/drawing/2014/main" id="{E0CE3A65-3FD8-F76A-CADB-D4431626095D}"/>
+                <a16:creationId xmlns:a16="http://schemas.microsoft.com/office/drawing/2014/main" id="{47EC095D-FC71-34C0-0D6F-8A76CD9CC283}"/>
               </a:ext>
             </a:extLst>
           </p:cNvPr>
@@ -9018,7 +9678,15 @@
           <a:bodyPr/>
           <a:lstStyle/>
           <a:p>
-            <a:endParaRPr lang="en-GB"/>
+            <a:r>
+              <a:rPr lang="zh-CN" altLang="en-US" dirty="0"/>
+              <a:t>儲存</a:t>
+            </a:r>
+            <a:r>
+              <a:rPr lang="en-GB" altLang="zh-CN" dirty="0" err="1"/>
+              <a:t>pth</a:t>
+            </a:r>
+            <a:endParaRPr lang="en-GB" dirty="0"/>
           </a:p>
         </p:txBody>
       </p:sp>
@@ -9027,7 +9695,7 @@
           <p:cNvPr id="3" name="Content Placeholder 2">
             <a:extLst>
               <a:ext uri="{FF2B5EF4-FFF2-40B4-BE49-F238E27FC236}">
-                <a16:creationId xmlns:a16="http://schemas.microsoft.com/office/drawing/2014/main" id="{C6462362-EF96-D3D9-45E3-E66E4EA0FCFE}"/>
+                <a16:creationId xmlns:a16="http://schemas.microsoft.com/office/drawing/2014/main" id="{C4625852-F318-2C3C-CB5E-D10A8A4B16FB}"/>
               </a:ext>
             </a:extLst>
           </p:cNvPr>
@@ -9043,20 +9711,13 @@
           <a:bodyPr/>
           <a:lstStyle/>
           <a:p>
-            <a:pPr marL="0" indent="0">
-              <a:buNone/>
-            </a:pPr>
             <a:r>
               <a:rPr lang="zh-CN" altLang="en-US" dirty="0"/>
-              <a:t>接下來是針對會計模型的新理解， 之後選擇</a:t>
-            </a:r>
-            <a:r>
-              <a:rPr lang="en-GB" altLang="zh-CN" dirty="0"/>
-              <a:t>pretrain model</a:t>
-            </a:r>
-            <a:r>
-              <a:rPr lang="zh-CN" altLang="en-US" dirty="0"/>
-              <a:t>的方向</a:t>
+              <a:t>改</a:t>
+            </a:r>
+            <a:r>
+              <a:rPr lang="en-GB" altLang="zh-CN" dirty="0" err="1"/>
+              <a:t>chekcpoint</a:t>
             </a:r>
             <a:endParaRPr lang="en-GB" dirty="0"/>
           </a:p>
@@ -9065,7 +9726,7 @@
     </p:spTree>
     <p:extLst>
       <p:ext uri="{BB962C8B-B14F-4D97-AF65-F5344CB8AC3E}">
-        <p14:creationId xmlns:p14="http://schemas.microsoft.com/office/powerpoint/2010/main" val="1086669505"/>
+        <p14:creationId xmlns:p14="http://schemas.microsoft.com/office/powerpoint/2010/main" val="946307909"/>
       </p:ext>
     </p:extLst>
   </p:cSld>

</xml_diff>